<commit_message>
Added new creation work flow image
git-svn-id: https://svn.eiffel.com/eiffelstudio/trunk@80320 8089f293-4706-0410-a29e-feb5c42a2edf
</commit_message>
<xml_diff>
--- a/Src/framework/web/xebra/doc/XEbraCreationWorkflow.pptx
+++ b/Src/framework/web/xebra/doc/XEbraCreationWorkflow.pptx
@@ -16,10 +16,6 @@
       <p:bold r:id="rId4"/>
       <p:italic r:id="rId5"/>
       <p:boldItalic r:id="rId6"/>
-    </p:embeddedFont>
-    <p:embeddedFont>
-      <p:font typeface="Mongolian Baiti" pitchFamily="66" charset="0"/>
-      <p:regular r:id="rId7"/>
     </p:embeddedFont>
   </p:embeddedFontLst>
   <p:defaultTextStyle>
@@ -302,7 +298,7 @@
             <a:fld id="{46FF9539-AE5F-4A30-82FB-C6B65AB5BCD0}" type="datetimeFigureOut">
               <a:rPr lang="en-US" smtClean="0"/>
               <a:pPr/>
-              <a:t>3/6/2009</a:t>
+              <a:t>8/18/2009</a:t>
             </a:fld>
             <a:endParaRPr lang="en-US"/>
           </a:p>
@@ -469,7 +465,7 @@
             <a:fld id="{46FF9539-AE5F-4A30-82FB-C6B65AB5BCD0}" type="datetimeFigureOut">
               <a:rPr lang="en-US" smtClean="0"/>
               <a:pPr/>
-              <a:t>3/6/2009</a:t>
+              <a:t>8/18/2009</a:t>
             </a:fld>
             <a:endParaRPr lang="en-US"/>
           </a:p>
@@ -646,7 +642,7 @@
             <a:fld id="{46FF9539-AE5F-4A30-82FB-C6B65AB5BCD0}" type="datetimeFigureOut">
               <a:rPr lang="en-US" smtClean="0"/>
               <a:pPr/>
-              <a:t>3/6/2009</a:t>
+              <a:t>8/18/2009</a:t>
             </a:fld>
             <a:endParaRPr lang="en-US"/>
           </a:p>
@@ -813,7 +809,7 @@
             <a:fld id="{46FF9539-AE5F-4A30-82FB-C6B65AB5BCD0}" type="datetimeFigureOut">
               <a:rPr lang="en-US" smtClean="0"/>
               <a:pPr/>
-              <a:t>3/6/2009</a:t>
+              <a:t>8/18/2009</a:t>
             </a:fld>
             <a:endParaRPr lang="en-US"/>
           </a:p>
@@ -1056,7 +1052,7 @@
             <a:fld id="{46FF9539-AE5F-4A30-82FB-C6B65AB5BCD0}" type="datetimeFigureOut">
               <a:rPr lang="en-US" smtClean="0"/>
               <a:pPr/>
-              <a:t>3/6/2009</a:t>
+              <a:t>8/18/2009</a:t>
             </a:fld>
             <a:endParaRPr lang="en-US"/>
           </a:p>
@@ -1341,7 +1337,7 @@
             <a:fld id="{46FF9539-AE5F-4A30-82FB-C6B65AB5BCD0}" type="datetimeFigureOut">
               <a:rPr lang="en-US" smtClean="0"/>
               <a:pPr/>
-              <a:t>3/6/2009</a:t>
+              <a:t>8/18/2009</a:t>
             </a:fld>
             <a:endParaRPr lang="en-US"/>
           </a:p>
@@ -1760,7 +1756,7 @@
             <a:fld id="{46FF9539-AE5F-4A30-82FB-C6B65AB5BCD0}" type="datetimeFigureOut">
               <a:rPr lang="en-US" smtClean="0"/>
               <a:pPr/>
-              <a:t>3/6/2009</a:t>
+              <a:t>8/18/2009</a:t>
             </a:fld>
             <a:endParaRPr lang="en-US"/>
           </a:p>
@@ -1875,7 +1871,7 @@
             <a:fld id="{46FF9539-AE5F-4A30-82FB-C6B65AB5BCD0}" type="datetimeFigureOut">
               <a:rPr lang="en-US" smtClean="0"/>
               <a:pPr/>
-              <a:t>3/6/2009</a:t>
+              <a:t>8/18/2009</a:t>
             </a:fld>
             <a:endParaRPr lang="en-US"/>
           </a:p>
@@ -1967,7 +1963,7 @@
             <a:fld id="{46FF9539-AE5F-4A30-82FB-C6B65AB5BCD0}" type="datetimeFigureOut">
               <a:rPr lang="en-US" smtClean="0"/>
               <a:pPr/>
-              <a:t>3/6/2009</a:t>
+              <a:t>8/18/2009</a:t>
             </a:fld>
             <a:endParaRPr lang="en-US"/>
           </a:p>
@@ -2241,7 +2237,7 @@
             <a:fld id="{46FF9539-AE5F-4A30-82FB-C6B65AB5BCD0}" type="datetimeFigureOut">
               <a:rPr lang="en-US" smtClean="0"/>
               <a:pPr/>
-              <a:t>3/6/2009</a:t>
+              <a:t>8/18/2009</a:t>
             </a:fld>
             <a:endParaRPr lang="en-US"/>
           </a:p>
@@ -2491,7 +2487,7 @@
             <a:fld id="{46FF9539-AE5F-4A30-82FB-C6B65AB5BCD0}" type="datetimeFigureOut">
               <a:rPr lang="en-US" smtClean="0"/>
               <a:pPr/>
-              <a:t>3/6/2009</a:t>
+              <a:t>8/18/2009</a:t>
             </a:fld>
             <a:endParaRPr lang="en-US"/>
           </a:p>
@@ -2701,7 +2697,7 @@
             <a:fld id="{46FF9539-AE5F-4A30-82FB-C6B65AB5BCD0}" type="datetimeFigureOut">
               <a:rPr lang="en-US" smtClean="0"/>
               <a:pPr/>
-              <a:t>3/6/2009</a:t>
+              <a:t>8/18/2009</a:t>
             </a:fld>
             <a:endParaRPr lang="en-US"/>
           </a:p>
@@ -3074,13 +3070,13 @@
       </p:grpSpPr>
       <p:cxnSp>
         <p:nvCxnSpPr>
-          <p:cNvPr id="54" name="Gerade Verbindung 53"/>
+          <p:cNvPr id="56" name="Gerade Verbindung 55"/>
           <p:cNvCxnSpPr/>
           <p:nvPr/>
         </p:nvCxnSpPr>
         <p:spPr>
           <a:xfrm>
-            <a:off x="0" y="4786322"/>
+            <a:off x="0" y="5357826"/>
             <a:ext cx="9144000" cy="1588"/>
           </a:xfrm>
           <a:prstGeom prst="line">
@@ -3118,7 +3114,7 @@
         </p:nvCxnSpPr>
         <p:spPr>
           <a:xfrm>
-            <a:off x="0" y="2285992"/>
+            <a:off x="0" y="1214422"/>
             <a:ext cx="9144000" cy="1588"/>
           </a:xfrm>
           <a:prstGeom prst="line">
@@ -3148,6 +3144,44 @@
           </a:fontRef>
         </p:style>
       </p:cxnSp>
+      <p:cxnSp>
+        <p:nvCxnSpPr>
+          <p:cNvPr id="54" name="Gerade Verbindung 53"/>
+          <p:cNvCxnSpPr/>
+          <p:nvPr/>
+        </p:nvCxnSpPr>
+        <p:spPr>
+          <a:xfrm>
+            <a:off x="-71470" y="2428868"/>
+            <a:ext cx="9215470" cy="0"/>
+          </a:xfrm>
+          <a:prstGeom prst="line">
+            <a:avLst/>
+          </a:prstGeom>
+          <a:ln w="28575">
+            <a:solidFill>
+              <a:schemeClr val="accent2">
+                <a:lumMod val="50000"/>
+              </a:schemeClr>
+            </a:solidFill>
+          </a:ln>
+          <a:effectLst/>
+        </p:spPr>
+        <p:style>
+          <a:lnRef idx="2">
+            <a:schemeClr val="accent2"/>
+          </a:lnRef>
+          <a:fillRef idx="0">
+            <a:schemeClr val="accent2"/>
+          </a:fillRef>
+          <a:effectRef idx="1">
+            <a:schemeClr val="accent2"/>
+          </a:effectRef>
+          <a:fontRef idx="minor">
+            <a:schemeClr val="tx1"/>
+          </a:fontRef>
+        </p:style>
+      </p:cxnSp>
       <p:sp>
         <p:nvSpPr>
           <p:cNvPr id="16" name="Rechteck 15"/>
@@ -3158,8 +3192,8 @@
         </p:nvSpPr>
         <p:spPr>
           <a:xfrm rot="-5400000">
-            <a:off x="-857244" y="857244"/>
-            <a:ext cx="2285992" cy="571504"/>
+            <a:off x="-321459" y="321459"/>
+            <a:ext cx="1214422" cy="571504"/>
           </a:xfrm>
           <a:prstGeom prst="rect">
             <a:avLst/>
@@ -3188,7 +3222,7 @@
             <a:pPr algn="ctr"/>
             <a:r>
               <a:rPr lang="de-CH" dirty="0" smtClean="0"/>
-              <a:t>DESIGNING</a:t>
+              <a:t>DESIGN</a:t>
             </a:r>
             <a:endParaRPr lang="en-US" dirty="0"/>
           </a:p>
@@ -3204,8 +3238,8 @@
         </p:nvSpPr>
         <p:spPr>
           <a:xfrm rot="-5400000">
-            <a:off x="-964413" y="3250405"/>
-            <a:ext cx="2500330" cy="571504"/>
+            <a:off x="-321459" y="1535881"/>
+            <a:ext cx="1214422" cy="571504"/>
           </a:xfrm>
           <a:prstGeom prst="rect">
             <a:avLst/>
@@ -3234,7 +3268,7 @@
             <a:pPr algn="ctr"/>
             <a:r>
               <a:rPr lang="de-CH" dirty="0" smtClean="0"/>
-              <a:t>ENGINEERING</a:t>
+              <a:t>LOGIC</a:t>
             </a:r>
             <a:endParaRPr lang="en-US" dirty="0"/>
           </a:p>
@@ -3242,7 +3276,455 @@
       </p:sp>
       <p:sp>
         <p:nvSpPr>
-          <p:cNvPr id="18" name="Rechteck 17"/>
+          <p:cNvPr id="19" name="Abgerundetes Rechteck 18"/>
+          <p:cNvSpPr/>
+          <p:nvPr/>
+        </p:nvSpPr>
+        <p:spPr>
+          <a:xfrm>
+            <a:off x="714348" y="214290"/>
+            <a:ext cx="1571636" cy="642942"/>
+          </a:xfrm>
+          <a:prstGeom prst="roundRect">
+            <a:avLst/>
+          </a:prstGeom>
+        </p:spPr>
+        <p:style>
+          <a:lnRef idx="2">
+            <a:schemeClr val="accent3">
+              <a:shade val="50000"/>
+            </a:schemeClr>
+          </a:lnRef>
+          <a:fillRef idx="1">
+            <a:schemeClr val="accent3"/>
+          </a:fillRef>
+          <a:effectRef idx="0">
+            <a:schemeClr val="accent3"/>
+          </a:effectRef>
+          <a:fontRef idx="minor">
+            <a:schemeClr val="lt1"/>
+          </a:fontRef>
+        </p:style>
+        <p:txBody>
+          <a:bodyPr rtlCol="0" anchor="ctr"/>
+          <a:lstStyle/>
+          <a:p>
+            <a:pPr algn="ctr"/>
+            <a:r>
+              <a:rPr lang="de-CH" dirty="0" smtClean="0"/>
+              <a:t>HTML Editor</a:t>
+            </a:r>
+          </a:p>
+        </p:txBody>
+      </p:sp>
+      <p:sp>
+        <p:nvSpPr>
+          <p:cNvPr id="21" name="Textfeld 20"/>
+          <p:cNvSpPr txBox="1"/>
+          <p:nvPr/>
+        </p:nvSpPr>
+        <p:spPr>
+          <a:xfrm>
+            <a:off x="2500298" y="214290"/>
+            <a:ext cx="2643206" cy="523220"/>
+          </a:xfrm>
+          <a:prstGeom prst="rect">
+            <a:avLst/>
+          </a:prstGeom>
+          <a:noFill/>
+        </p:spPr>
+        <p:txBody>
+          <a:bodyPr wrap="square" rtlCol="0">
+            <a:spAutoFit/>
+          </a:bodyPr>
+          <a:lstStyle/>
+          <a:p>
+            <a:r>
+              <a:rPr lang="de-CH" sz="1400" i="1" dirty="0" smtClean="0"/>
+              <a:t>Design </a:t>
+            </a:r>
+            <a:r>
+              <a:rPr lang="de-CH" sz="1400" i="1" dirty="0" err="1" smtClean="0"/>
+              <a:t>website</a:t>
+            </a:r>
+            <a:r>
+              <a:rPr lang="de-CH" sz="1400" i="1" dirty="0" smtClean="0"/>
+              <a:t> </a:t>
+            </a:r>
+            <a:r>
+              <a:rPr lang="de-CH" sz="1400" i="1" dirty="0" err="1" smtClean="0"/>
+              <a:t>using</a:t>
+            </a:r>
+            <a:r>
+              <a:rPr lang="de-CH" sz="1400" i="1" dirty="0" smtClean="0"/>
+              <a:t> XHTML </a:t>
+            </a:r>
+            <a:r>
+              <a:rPr lang="de-CH" sz="1400" i="1" dirty="0" err="1" smtClean="0"/>
+              <a:t>and</a:t>
+            </a:r>
+            <a:r>
+              <a:rPr lang="de-CH" sz="1400" i="1" dirty="0" smtClean="0"/>
+              <a:t> </a:t>
+            </a:r>
+            <a:r>
+              <a:rPr lang="de-CH" sz="1400" i="1" dirty="0" err="1" smtClean="0"/>
+              <a:t>Xebra</a:t>
+            </a:r>
+            <a:r>
+              <a:rPr lang="de-CH" sz="1400" i="1" dirty="0" smtClean="0"/>
+              <a:t> Tags</a:t>
+            </a:r>
+            <a:endParaRPr lang="en-US" sz="1400" i="1" dirty="0"/>
+          </a:p>
+        </p:txBody>
+      </p:sp>
+      <p:sp>
+        <p:nvSpPr>
+          <p:cNvPr id="31" name="Pfeil nach unten 30"/>
+          <p:cNvSpPr/>
+          <p:nvPr/>
+        </p:nvSpPr>
+        <p:spPr>
+          <a:xfrm>
+            <a:off x="1214414" y="928670"/>
+            <a:ext cx="500066" cy="1857388"/>
+          </a:xfrm>
+          <a:prstGeom prst="downArrow">
+            <a:avLst/>
+          </a:prstGeom>
+        </p:spPr>
+        <p:style>
+          <a:lnRef idx="2">
+            <a:schemeClr val="accent5">
+              <a:shade val="50000"/>
+            </a:schemeClr>
+          </a:lnRef>
+          <a:fillRef idx="1">
+            <a:schemeClr val="accent5"/>
+          </a:fillRef>
+          <a:effectRef idx="0">
+            <a:schemeClr val="accent5"/>
+          </a:effectRef>
+          <a:fontRef idx="minor">
+            <a:schemeClr val="lt1"/>
+          </a:fontRef>
+        </p:style>
+        <p:txBody>
+          <a:bodyPr rtlCol="0" anchor="ctr"/>
+          <a:lstStyle/>
+          <a:p>
+            <a:pPr algn="ctr"/>
+            <a:endParaRPr lang="en-US" dirty="0"/>
+          </a:p>
+        </p:txBody>
+      </p:sp>
+      <p:sp>
+        <p:nvSpPr>
+          <p:cNvPr id="42" name="Abgerundetes Rechteck 41"/>
+          <p:cNvSpPr/>
+          <p:nvPr/>
+        </p:nvSpPr>
+        <p:spPr>
+          <a:xfrm>
+            <a:off x="6000760" y="1357298"/>
+            <a:ext cx="1571636" cy="642942"/>
+          </a:xfrm>
+          <a:prstGeom prst="roundRect">
+            <a:avLst/>
+          </a:prstGeom>
+        </p:spPr>
+        <p:style>
+          <a:lnRef idx="2">
+            <a:schemeClr val="accent1">
+              <a:shade val="50000"/>
+            </a:schemeClr>
+          </a:lnRef>
+          <a:fillRef idx="1">
+            <a:schemeClr val="accent1"/>
+          </a:fillRef>
+          <a:effectRef idx="0">
+            <a:schemeClr val="accent1"/>
+          </a:effectRef>
+          <a:fontRef idx="minor">
+            <a:schemeClr val="lt1"/>
+          </a:fontRef>
+        </p:style>
+        <p:txBody>
+          <a:bodyPr rtlCol="0" anchor="ctr"/>
+          <a:lstStyle/>
+          <a:p>
+            <a:pPr algn="ctr"/>
+            <a:r>
+              <a:rPr lang="de-CH" dirty="0" smtClean="0"/>
+              <a:t>Eiffel </a:t>
+            </a:r>
+            <a:r>
+              <a:rPr lang="de-CH" dirty="0" smtClean="0"/>
+              <a:t>Studio</a:t>
+            </a:r>
+            <a:endParaRPr lang="de-CH" dirty="0" smtClean="0"/>
+          </a:p>
+        </p:txBody>
+      </p:sp>
+      <p:sp>
+        <p:nvSpPr>
+          <p:cNvPr id="46" name="Textfeld 45"/>
+          <p:cNvSpPr txBox="1"/>
+          <p:nvPr/>
+        </p:nvSpPr>
+        <p:spPr>
+          <a:xfrm>
+            <a:off x="4000496" y="1357298"/>
+            <a:ext cx="2000264" cy="523220"/>
+          </a:xfrm>
+          <a:prstGeom prst="rect">
+            <a:avLst/>
+          </a:prstGeom>
+          <a:noFill/>
+        </p:spPr>
+        <p:txBody>
+          <a:bodyPr wrap="square" rtlCol="0">
+            <a:spAutoFit/>
+          </a:bodyPr>
+          <a:lstStyle/>
+          <a:p>
+            <a:pPr algn="r"/>
+            <a:r>
+              <a:rPr lang="de-CH" sz="1400" i="1" dirty="0" smtClean="0"/>
+              <a:t>Create </a:t>
+            </a:r>
+            <a:r>
+              <a:rPr lang="de-CH" sz="1400" i="1" dirty="0" err="1" smtClean="0"/>
+              <a:t>domain</a:t>
+            </a:r>
+            <a:r>
+              <a:rPr lang="de-CH" sz="1400" i="1" dirty="0" smtClean="0"/>
+              <a:t> </a:t>
+            </a:r>
+            <a:r>
+              <a:rPr lang="de-CH" sz="1400" i="1" dirty="0" err="1" smtClean="0"/>
+              <a:t>specific</a:t>
+            </a:r>
+            <a:r>
+              <a:rPr lang="de-CH" sz="1400" i="1" dirty="0" smtClean="0"/>
+              <a:t> </a:t>
+            </a:r>
+            <a:r>
+              <a:rPr lang="de-CH" sz="1400" i="1" dirty="0" err="1" smtClean="0"/>
+              <a:t>classes</a:t>
+            </a:r>
+            <a:r>
+              <a:rPr lang="de-CH" sz="1400" i="1" dirty="0" smtClean="0"/>
+              <a:t> in Eiffel Studio</a:t>
+            </a:r>
+            <a:endParaRPr lang="en-US" sz="1400" i="1" dirty="0"/>
+          </a:p>
+        </p:txBody>
+      </p:sp>
+      <p:sp>
+        <p:nvSpPr>
+          <p:cNvPr id="28" name="Rechteck 27"/>
+          <p:cNvSpPr/>
+          <p:nvPr/>
+        </p:nvSpPr>
+        <p:spPr>
+          <a:xfrm>
+            <a:off x="1000100" y="2857496"/>
+            <a:ext cx="928694" cy="285752"/>
+          </a:xfrm>
+          <a:prstGeom prst="rect">
+            <a:avLst/>
+          </a:prstGeom>
+          <a:solidFill>
+            <a:schemeClr val="bg1">
+              <a:lumMod val="95000"/>
+            </a:schemeClr>
+          </a:solidFill>
+          <a:ln w="12700">
+            <a:solidFill>
+              <a:schemeClr val="bg1">
+                <a:lumMod val="50000"/>
+              </a:schemeClr>
+            </a:solidFill>
+          </a:ln>
+        </p:spPr>
+        <p:style>
+          <a:lnRef idx="2">
+            <a:schemeClr val="accent1">
+              <a:shade val="50000"/>
+            </a:schemeClr>
+          </a:lnRef>
+          <a:fillRef idx="1">
+            <a:schemeClr val="accent1"/>
+          </a:fillRef>
+          <a:effectRef idx="0">
+            <a:schemeClr val="accent1"/>
+          </a:effectRef>
+          <a:fontRef idx="minor">
+            <a:schemeClr val="lt1"/>
+          </a:fontRef>
+        </p:style>
+        <p:txBody>
+          <a:bodyPr rtlCol="0" anchor="ctr"/>
+          <a:lstStyle/>
+          <a:p>
+            <a:pPr algn="ctr"/>
+            <a:r>
+              <a:rPr lang="de-CH" sz="1000" dirty="0" smtClean="0">
+                <a:solidFill>
+                  <a:schemeClr val="tx1"/>
+                </a:solidFill>
+              </a:rPr>
+              <a:t>index.xeb</a:t>
+            </a:r>
+            <a:endParaRPr lang="en-US" sz="1000" dirty="0">
+              <a:solidFill>
+                <a:schemeClr val="tx1"/>
+              </a:solidFill>
+            </a:endParaRPr>
+          </a:p>
+        </p:txBody>
+      </p:sp>
+      <p:sp>
+        <p:nvSpPr>
+          <p:cNvPr id="29" name="Rechteck 28"/>
+          <p:cNvSpPr/>
+          <p:nvPr/>
+        </p:nvSpPr>
+        <p:spPr>
+          <a:xfrm>
+            <a:off x="1000100" y="3214686"/>
+            <a:ext cx="928694" cy="285752"/>
+          </a:xfrm>
+          <a:prstGeom prst="rect">
+            <a:avLst/>
+          </a:prstGeom>
+          <a:solidFill>
+            <a:schemeClr val="bg1">
+              <a:lumMod val="95000"/>
+            </a:schemeClr>
+          </a:solidFill>
+          <a:ln w="12700">
+            <a:solidFill>
+              <a:schemeClr val="bg1">
+                <a:lumMod val="50000"/>
+              </a:schemeClr>
+            </a:solidFill>
+          </a:ln>
+        </p:spPr>
+        <p:style>
+          <a:lnRef idx="2">
+            <a:schemeClr val="accent1">
+              <a:shade val="50000"/>
+            </a:schemeClr>
+          </a:lnRef>
+          <a:fillRef idx="1">
+            <a:schemeClr val="accent1"/>
+          </a:fillRef>
+          <a:effectRef idx="0">
+            <a:schemeClr val="accent1"/>
+          </a:effectRef>
+          <a:fontRef idx="minor">
+            <a:schemeClr val="lt1"/>
+          </a:fontRef>
+        </p:style>
+        <p:txBody>
+          <a:bodyPr rtlCol="0" anchor="ctr"/>
+          <a:lstStyle/>
+          <a:p>
+            <a:pPr algn="ctr"/>
+            <a:r>
+              <a:rPr lang="de-CH" sz="1000" dirty="0" smtClean="0">
+                <a:solidFill>
+                  <a:schemeClr val="tx1"/>
+                </a:solidFill>
+              </a:rPr>
+              <a:t>h</a:t>
+            </a:r>
+            <a:r>
+              <a:rPr lang="de-CH" sz="1000" dirty="0" smtClean="0">
+                <a:solidFill>
+                  <a:schemeClr val="tx1"/>
+                </a:solidFill>
+              </a:rPr>
+              <a:t>ome.xeb</a:t>
+            </a:r>
+            <a:endParaRPr lang="en-US" sz="1000" dirty="0">
+              <a:solidFill>
+                <a:schemeClr val="tx1"/>
+              </a:solidFill>
+            </a:endParaRPr>
+          </a:p>
+        </p:txBody>
+      </p:sp>
+      <p:sp>
+        <p:nvSpPr>
+          <p:cNvPr id="32" name="Rechteck 31"/>
+          <p:cNvSpPr/>
+          <p:nvPr/>
+        </p:nvSpPr>
+        <p:spPr>
+          <a:xfrm>
+            <a:off x="1000100" y="3571876"/>
+            <a:ext cx="928694" cy="285752"/>
+          </a:xfrm>
+          <a:prstGeom prst="rect">
+            <a:avLst/>
+          </a:prstGeom>
+          <a:solidFill>
+            <a:schemeClr val="bg1">
+              <a:lumMod val="95000"/>
+            </a:schemeClr>
+          </a:solidFill>
+          <a:ln w="12700">
+            <a:solidFill>
+              <a:schemeClr val="bg1">
+                <a:lumMod val="50000"/>
+              </a:schemeClr>
+            </a:solidFill>
+          </a:ln>
+        </p:spPr>
+        <p:style>
+          <a:lnRef idx="2">
+            <a:schemeClr val="accent1">
+              <a:shade val="50000"/>
+            </a:schemeClr>
+          </a:lnRef>
+          <a:fillRef idx="1">
+            <a:schemeClr val="accent1"/>
+          </a:fillRef>
+          <a:effectRef idx="0">
+            <a:schemeClr val="accent1"/>
+          </a:effectRef>
+          <a:fontRef idx="minor">
+            <a:schemeClr val="lt1"/>
+          </a:fontRef>
+        </p:style>
+        <p:txBody>
+          <a:bodyPr rtlCol="0" anchor="ctr"/>
+          <a:lstStyle/>
+          <a:p>
+            <a:pPr algn="ctr"/>
+            <a:r>
+              <a:rPr lang="de-CH" sz="1000" dirty="0" smtClean="0">
+                <a:solidFill>
+                  <a:schemeClr val="tx1"/>
+                </a:solidFill>
+              </a:rPr>
+              <a:t>master.xeb</a:t>
+            </a:r>
+            <a:endParaRPr lang="en-US" sz="1000" dirty="0">
+              <a:solidFill>
+                <a:schemeClr val="tx1"/>
+              </a:solidFill>
+            </a:endParaRPr>
+          </a:p>
+        </p:txBody>
+      </p:sp>
+      <p:sp>
+        <p:nvSpPr>
+          <p:cNvPr id="36" name="Rechteck 35"/>
           <p:cNvSpPr>
             <a:spLocks/>
           </p:cNvSpPr>
@@ -3250,8 +3732,8 @@
         </p:nvSpPr>
         <p:spPr>
           <a:xfrm rot="-5400000">
-            <a:off x="-750087" y="5536409"/>
-            <a:ext cx="2071678" cy="571504"/>
+            <a:off x="-1178727" y="3607595"/>
+            <a:ext cx="2928958" cy="571504"/>
           </a:xfrm>
           <a:prstGeom prst="rect">
             <a:avLst/>
@@ -3280,7 +3762,7 @@
             <a:pPr algn="ctr"/>
             <a:r>
               <a:rPr lang="de-CH" dirty="0" smtClean="0"/>
-              <a:t>DEPLOYING</a:t>
+              <a:t>DEPLOY</a:t>
             </a:r>
             <a:endParaRPr lang="en-US" dirty="0"/>
           </a:p>
@@ -3288,57 +3770,14 @@
       </p:sp>
       <p:sp>
         <p:nvSpPr>
-          <p:cNvPr id="19" name="Abgerundetes Rechteck 18"/>
+          <p:cNvPr id="37" name="Pfeil nach unten 36"/>
           <p:cNvSpPr/>
           <p:nvPr/>
         </p:nvSpPr>
         <p:spPr>
           <a:xfrm>
-            <a:off x="3143208" y="214290"/>
-            <a:ext cx="1785950" cy="857256"/>
-          </a:xfrm>
-          <a:prstGeom prst="roundRect">
-            <a:avLst/>
-          </a:prstGeom>
-        </p:spPr>
-        <p:style>
-          <a:lnRef idx="2">
-            <a:schemeClr val="accent3">
-              <a:shade val="50000"/>
-            </a:schemeClr>
-          </a:lnRef>
-          <a:fillRef idx="1">
-            <a:schemeClr val="accent3"/>
-          </a:fillRef>
-          <a:effectRef idx="0">
-            <a:schemeClr val="accent3"/>
-          </a:effectRef>
-          <a:fontRef idx="minor">
-            <a:schemeClr val="lt1"/>
-          </a:fontRef>
-        </p:style>
-        <p:txBody>
-          <a:bodyPr rtlCol="0" anchor="ctr"/>
-          <a:lstStyle/>
-          <a:p>
-            <a:pPr algn="ctr"/>
-            <a:r>
-              <a:rPr lang="de-CH" dirty="0" smtClean="0"/>
-              <a:t>HTML Editor</a:t>
-            </a:r>
-          </a:p>
-        </p:txBody>
-      </p:sp>
-      <p:sp>
-        <p:nvSpPr>
-          <p:cNvPr id="20" name="Pfeil nach unten 19"/>
-          <p:cNvSpPr/>
-          <p:nvPr/>
-        </p:nvSpPr>
-        <p:spPr>
-          <a:xfrm>
-            <a:off x="3714744" y="2143116"/>
-            <a:ext cx="500066" cy="357190"/>
+            <a:off x="6572264" y="2071678"/>
+            <a:ext cx="500066" cy="714380"/>
           </a:xfrm>
           <a:prstGeom prst="downArrow">
             <a:avLst/>
@@ -3371,106 +3810,28 @@
       </p:sp>
       <p:sp>
         <p:nvSpPr>
-          <p:cNvPr id="21" name="Textfeld 20"/>
-          <p:cNvSpPr txBox="1"/>
-          <p:nvPr/>
-        </p:nvSpPr>
-        <p:spPr>
-          <a:xfrm>
-            <a:off x="4929158" y="214290"/>
-            <a:ext cx="2643206" cy="523220"/>
-          </a:xfrm>
-          <a:prstGeom prst="rect">
-            <a:avLst/>
-          </a:prstGeom>
-          <a:noFill/>
-        </p:spPr>
-        <p:txBody>
-          <a:bodyPr wrap="square" rtlCol="0">
-            <a:spAutoFit/>
-          </a:bodyPr>
-          <a:lstStyle/>
-          <a:p>
-            <a:r>
-              <a:rPr lang="de-CH" sz="1400" i="1" dirty="0" smtClean="0"/>
-              <a:t>Design </a:t>
-            </a:r>
-            <a:r>
-              <a:rPr lang="de-CH" sz="1400" i="1" dirty="0" err="1" smtClean="0"/>
-              <a:t>website</a:t>
-            </a:r>
-            <a:r>
-              <a:rPr lang="de-CH" sz="1400" i="1" dirty="0" smtClean="0"/>
-              <a:t> </a:t>
-            </a:r>
-            <a:r>
-              <a:rPr lang="de-CH" sz="1400" i="1" dirty="0" err="1" smtClean="0"/>
-              <a:t>using</a:t>
-            </a:r>
-            <a:r>
-              <a:rPr lang="de-CH" sz="1400" i="1" dirty="0" smtClean="0"/>
-              <a:t> </a:t>
-            </a:r>
-            <a:r>
-              <a:rPr lang="de-CH" sz="1400" i="1" dirty="0" smtClean="0"/>
-              <a:t>XHTML </a:t>
-            </a:r>
-            <a:r>
-              <a:rPr lang="de-CH" sz="1400" i="1" dirty="0" err="1" smtClean="0"/>
-              <a:t>and</a:t>
-            </a:r>
-            <a:r>
-              <a:rPr lang="de-CH" sz="1400" i="1" dirty="0" smtClean="0"/>
-              <a:t> </a:t>
-            </a:r>
-            <a:r>
-              <a:rPr lang="de-CH" sz="1400" i="1" dirty="0" err="1" smtClean="0"/>
-              <a:t>XEbra</a:t>
-            </a:r>
-            <a:r>
-              <a:rPr lang="de-CH" sz="1400" i="1" dirty="0" smtClean="0"/>
-              <a:t> </a:t>
-            </a:r>
-            <a:r>
-              <a:rPr lang="de-CH" sz="1400" i="1" dirty="0"/>
-              <a:t>S</a:t>
-            </a:r>
-            <a:r>
-              <a:rPr lang="de-CH" sz="1400" i="1" dirty="0" smtClean="0"/>
-              <a:t>cript </a:t>
-            </a:r>
-            <a:r>
-              <a:rPr lang="de-CH" sz="1400" i="1" dirty="0"/>
-              <a:t>C</a:t>
-            </a:r>
-            <a:r>
-              <a:rPr lang="de-CH" sz="1400" i="1" dirty="0" smtClean="0"/>
-              <a:t>ode</a:t>
-            </a:r>
-            <a:endParaRPr lang="en-US" sz="1400" i="1" dirty="0"/>
-          </a:p>
-        </p:txBody>
-      </p:sp>
-      <p:sp>
-        <p:nvSpPr>
-          <p:cNvPr id="22" name="Rechteck 21"/>
+          <p:cNvPr id="40" name="Rechteck 39"/>
           <p:cNvSpPr/>
           <p:nvPr/>
         </p:nvSpPr>
         <p:spPr>
           <a:xfrm>
-            <a:off x="642910" y="142852"/>
-            <a:ext cx="2428892" cy="2071702"/>
+            <a:off x="6215074" y="2857496"/>
+            <a:ext cx="1285884" cy="285752"/>
           </a:xfrm>
           <a:prstGeom prst="rect">
             <a:avLst/>
           </a:prstGeom>
           <a:solidFill>
-            <a:schemeClr val="bg1"/>
+            <a:schemeClr val="bg1">
+              <a:lumMod val="95000"/>
+            </a:schemeClr>
           </a:solidFill>
-          <a:ln w="3175">
+          <a:ln w="12700">
             <a:solidFill>
-              <a:schemeClr val="tx1"/>
+              <a:schemeClr val="bg1">
+                <a:lumMod val="50000"/>
+              </a:schemeClr>
             </a:solidFill>
           </a:ln>
         </p:spPr>
@@ -3494,255 +3855,47 @@
           <a:bodyPr rtlCol="0" anchor="ctr"/>
           <a:lstStyle/>
           <a:p>
-            <a:r>
-              <a:rPr lang="de-CH" sz="1400" dirty="0" smtClean="0">
+            <a:pPr algn="ctr"/>
+            <a:r>
+              <a:rPr lang="de-CH" sz="1000" dirty="0" err="1" smtClean="0">
                 <a:solidFill>
                   <a:schemeClr val="tx1"/>
                 </a:solidFill>
-                <a:latin typeface="Mongolian Baiti" pitchFamily="66" charset="0"/>
-                <a:cs typeface="Mongolian Baiti" pitchFamily="66" charset="0"/>
               </a:rPr>
-              <a:t>&lt;</a:t>
-            </a:r>
-            <a:r>
-              <a:rPr lang="de-CH" sz="1400" dirty="0" err="1" smtClean="0">
-                <a:solidFill>
-                  <a:schemeClr val="tx1"/>
-                </a:solidFill>
-                <a:latin typeface="Mongolian Baiti" pitchFamily="66" charset="0"/>
-                <a:cs typeface="Mongolian Baiti" pitchFamily="66" charset="0"/>
-              </a:rPr>
-              <a:t>html</a:t>
-            </a:r>
-            <a:r>
-              <a:rPr lang="de-CH" sz="1400" dirty="0" smtClean="0">
-                <a:solidFill>
-                  <a:schemeClr val="tx1"/>
-                </a:solidFill>
-                <a:latin typeface="Mongolian Baiti" pitchFamily="66" charset="0"/>
-                <a:cs typeface="Mongolian Baiti" pitchFamily="66" charset="0"/>
-              </a:rPr>
-              <a:t>&gt;</a:t>
-            </a:r>
-          </a:p>
-          <a:p>
-            <a:r>
-              <a:rPr lang="de-CH" sz="1400" dirty="0">
-                <a:solidFill>
-                  <a:schemeClr val="tx1"/>
-                </a:solidFill>
-                <a:latin typeface="Mongolian Baiti" pitchFamily="66" charset="0"/>
-                <a:cs typeface="Mongolian Baiti" pitchFamily="66" charset="0"/>
-              </a:rPr>
-              <a:t> </a:t>
-            </a:r>
-            <a:r>
-              <a:rPr lang="de-CH" sz="1400" dirty="0" smtClean="0">
-                <a:solidFill>
-                  <a:schemeClr val="tx1"/>
-                </a:solidFill>
-                <a:latin typeface="Mongolian Baiti" pitchFamily="66" charset="0"/>
-                <a:cs typeface="Mongolian Baiti" pitchFamily="66" charset="0"/>
-              </a:rPr>
-              <a:t> &lt;</a:t>
-            </a:r>
-            <a:r>
-              <a:rPr lang="de-CH" sz="1400" dirty="0" err="1" smtClean="0">
-                <a:solidFill>
-                  <a:schemeClr val="tx1"/>
-                </a:solidFill>
-                <a:latin typeface="Mongolian Baiti" pitchFamily="66" charset="0"/>
-                <a:cs typeface="Mongolian Baiti" pitchFamily="66" charset="0"/>
-              </a:rPr>
-              <a:t>body</a:t>
-            </a:r>
-            <a:r>
-              <a:rPr lang="de-CH" sz="1400" dirty="0" smtClean="0">
-                <a:solidFill>
-                  <a:schemeClr val="tx1"/>
-                </a:solidFill>
-                <a:latin typeface="Mongolian Baiti" pitchFamily="66" charset="0"/>
-                <a:cs typeface="Mongolian Baiti" pitchFamily="66" charset="0"/>
-              </a:rPr>
-              <a:t>&gt;</a:t>
-            </a:r>
-          </a:p>
-          <a:p>
-            <a:r>
-              <a:rPr lang="en-US" sz="1400" dirty="0" smtClean="0">
-                <a:solidFill>
-                  <a:schemeClr val="tx1"/>
-                </a:solidFill>
-                <a:latin typeface="Mongolian Baiti" pitchFamily="66" charset="0"/>
-                <a:cs typeface="Mongolian Baiti" pitchFamily="66" charset="0"/>
-              </a:rPr>
-              <a:t>     &lt;</a:t>
-            </a:r>
-            <a:r>
-              <a:rPr lang="en-US" sz="1400" dirty="0" smtClean="0">
-                <a:solidFill>
-                  <a:schemeClr val="tx1"/>
-                </a:solidFill>
-                <a:latin typeface="Mongolian Baiti" pitchFamily="66" charset="0"/>
-                <a:cs typeface="Mongolian Baiti" pitchFamily="66" charset="0"/>
-              </a:rPr>
-              <a:t>h1&gt;Hi!&lt;</a:t>
-            </a:r>
-            <a:r>
-              <a:rPr lang="en-US" sz="1400" dirty="0" smtClean="0">
-                <a:solidFill>
-                  <a:schemeClr val="tx1"/>
-                </a:solidFill>
-                <a:latin typeface="Mongolian Baiti" pitchFamily="66" charset="0"/>
-                <a:cs typeface="Mongolian Baiti" pitchFamily="66" charset="0"/>
-              </a:rPr>
-              <a:t>h2&gt;</a:t>
-            </a:r>
-          </a:p>
-          <a:p>
-            <a:r>
-              <a:rPr lang="en-US" sz="1400" dirty="0" smtClean="0">
-                <a:solidFill>
-                  <a:schemeClr val="tx1"/>
-                </a:solidFill>
-                <a:latin typeface="Mongolian Baiti" pitchFamily="66" charset="0"/>
-                <a:cs typeface="Mongolian Baiti" pitchFamily="66" charset="0"/>
-              </a:rPr>
-              <a:t>     </a:t>
-            </a:r>
-            <a:r>
-              <a:rPr lang="en-US" sz="1400" dirty="0" smtClean="0">
-                <a:solidFill>
-                  <a:schemeClr val="tx1"/>
-                </a:solidFill>
-                <a:latin typeface="Mongolian Baiti" pitchFamily="66" charset="0"/>
-                <a:cs typeface="Mongolian Baiti" pitchFamily="66" charset="0"/>
-              </a:rPr>
-              <a:t>&lt;%=</a:t>
-            </a:r>
-            <a:r>
-              <a:rPr lang="en-US" sz="1400" dirty="0" err="1" smtClean="0">
-                <a:solidFill>
-                  <a:schemeClr val="tx1"/>
-                </a:solidFill>
-                <a:latin typeface="Mongolian Baiti" pitchFamily="66" charset="0"/>
-                <a:cs typeface="Mongolian Baiti" pitchFamily="66" charset="0"/>
-              </a:rPr>
-              <a:t>say_hi</a:t>
-            </a:r>
-            <a:r>
-              <a:rPr lang="en-US" sz="1400" dirty="0" smtClean="0">
-                <a:solidFill>
-                  <a:schemeClr val="tx1"/>
-                </a:solidFill>
-                <a:latin typeface="Mongolian Baiti" pitchFamily="66" charset="0"/>
-                <a:cs typeface="Mongolian Baiti" pitchFamily="66" charset="0"/>
-              </a:rPr>
-              <a:t>%&gt;</a:t>
-            </a:r>
-            <a:endParaRPr lang="en-US" sz="1400" dirty="0" smtClean="0">
+              <a:t>main_controller.e</a:t>
+            </a:r>
+            <a:endParaRPr lang="en-US" sz="1000" dirty="0">
               <a:solidFill>
                 <a:schemeClr val="tx1"/>
               </a:solidFill>
-              <a:latin typeface="Mongolian Baiti" pitchFamily="66" charset="0"/>
-              <a:cs typeface="Mongolian Baiti" pitchFamily="66" charset="0"/>
             </a:endParaRPr>
           </a:p>
-          <a:p>
-            <a:r>
-              <a:rPr lang="de-CH" sz="1400" dirty="0" smtClean="0">
-                <a:solidFill>
-                  <a:schemeClr val="tx1"/>
-                </a:solidFill>
-                <a:latin typeface="Mongolian Baiti" pitchFamily="66" charset="0"/>
-                <a:cs typeface="Mongolian Baiti" pitchFamily="66" charset="0"/>
-              </a:rPr>
-              <a:t>  &lt;/</a:t>
-            </a:r>
-            <a:r>
-              <a:rPr lang="de-CH" sz="1400" dirty="0" err="1" smtClean="0">
-                <a:solidFill>
-                  <a:schemeClr val="tx1"/>
-                </a:solidFill>
-                <a:latin typeface="Mongolian Baiti" pitchFamily="66" charset="0"/>
-                <a:cs typeface="Mongolian Baiti" pitchFamily="66" charset="0"/>
-              </a:rPr>
-              <a:t>body</a:t>
-            </a:r>
-            <a:r>
-              <a:rPr lang="de-CH" sz="1400" dirty="0" smtClean="0">
-                <a:solidFill>
-                  <a:schemeClr val="tx1"/>
-                </a:solidFill>
-                <a:latin typeface="Mongolian Baiti" pitchFamily="66" charset="0"/>
-                <a:cs typeface="Mongolian Baiti" pitchFamily="66" charset="0"/>
-              </a:rPr>
-              <a:t>&gt;</a:t>
-            </a:r>
-          </a:p>
-          <a:p>
-            <a:r>
-              <a:rPr lang="de-CH" sz="1400" dirty="0" smtClean="0">
-                <a:solidFill>
-                  <a:schemeClr val="tx1"/>
-                </a:solidFill>
-                <a:latin typeface="Mongolian Baiti" pitchFamily="66" charset="0"/>
-                <a:cs typeface="Mongolian Baiti" pitchFamily="66" charset="0"/>
-              </a:rPr>
-              <a:t>&lt;/</a:t>
-            </a:r>
-            <a:r>
-              <a:rPr lang="de-CH" sz="1400" dirty="0" err="1" smtClean="0">
-                <a:solidFill>
-                  <a:schemeClr val="tx1"/>
-                </a:solidFill>
-                <a:latin typeface="Mongolian Baiti" pitchFamily="66" charset="0"/>
-                <a:cs typeface="Mongolian Baiti" pitchFamily="66" charset="0"/>
-              </a:rPr>
-              <a:t>html</a:t>
-            </a:r>
-            <a:r>
-              <a:rPr lang="de-CH" sz="1100" dirty="0" smtClean="0">
-                <a:solidFill>
-                  <a:schemeClr val="tx1"/>
-                </a:solidFill>
-                <a:latin typeface="Mongolian Baiti" pitchFamily="66" charset="0"/>
-                <a:cs typeface="Mongolian Baiti" pitchFamily="66" charset="0"/>
-              </a:rPr>
-              <a:t>&gt;</a:t>
-            </a:r>
-            <a:endParaRPr lang="en-US" sz="1100" dirty="0">
-              <a:solidFill>
-                <a:schemeClr val="tx1"/>
-              </a:solidFill>
-              <a:latin typeface="Mongolian Baiti" pitchFamily="66" charset="0"/>
-              <a:cs typeface="Mongolian Baiti" pitchFamily="66" charset="0"/>
-            </a:endParaRPr>
-          </a:p>
-        </p:txBody>
-      </p:sp>
-      <p:sp>
-        <p:nvSpPr>
-          <p:cNvPr id="30" name="Ellipse 29"/>
+        </p:txBody>
+      </p:sp>
+      <p:sp>
+        <p:nvSpPr>
+          <p:cNvPr id="41" name="Rechteck 40"/>
           <p:cNvSpPr/>
           <p:nvPr/>
         </p:nvSpPr>
         <p:spPr>
           <a:xfrm>
-            <a:off x="3428960" y="1500174"/>
-            <a:ext cx="1071570" cy="571504"/>
-          </a:xfrm>
-          <a:prstGeom prst="ellipse">
+            <a:off x="6215074" y="3214686"/>
+            <a:ext cx="1285884" cy="285752"/>
+          </a:xfrm>
+          <a:prstGeom prst="rect">
             <a:avLst/>
           </a:prstGeom>
           <a:solidFill>
             <a:schemeClr val="bg1">
-              <a:lumMod val="85000"/>
+              <a:lumMod val="95000"/>
             </a:schemeClr>
           </a:solidFill>
-          <a:ln w="9525">
+          <a:ln w="12700">
             <a:solidFill>
-              <a:schemeClr val="tx1"/>
+              <a:schemeClr val="bg1">
+                <a:lumMod val="50000"/>
+              </a:schemeClr>
             </a:solidFill>
           </a:ln>
         </p:spPr>
@@ -3768,14 +3921,14 @@
           <a:p>
             <a:pPr algn="ctr"/>
             <a:r>
-              <a:rPr lang="de-CH" sz="1200" dirty="0" smtClean="0">
+              <a:rPr lang="de-CH" sz="1000" dirty="0" err="1" smtClean="0">
                 <a:solidFill>
                   <a:schemeClr val="tx1"/>
                 </a:solidFill>
               </a:rPr>
-              <a:t>hi.xeb</a:t>
-            </a:r>
-            <a:endParaRPr lang="en-US" dirty="0">
+              <a:t>database.e</a:t>
+            </a:r>
+            <a:endParaRPr lang="en-US" sz="1000" dirty="0">
               <a:solidFill>
                 <a:schemeClr val="tx1"/>
               </a:solidFill>
@@ -3785,14 +3938,129 @@
       </p:sp>
       <p:sp>
         <p:nvSpPr>
-          <p:cNvPr id="31" name="Pfeil nach unten 30"/>
+          <p:cNvPr id="44" name="Rechteck 43"/>
           <p:cNvSpPr/>
           <p:nvPr/>
         </p:nvSpPr>
         <p:spPr>
           <a:xfrm>
-            <a:off x="3714712" y="1142984"/>
-            <a:ext cx="500066" cy="285752"/>
+            <a:off x="6215074" y="3571876"/>
+            <a:ext cx="1285884" cy="285752"/>
+          </a:xfrm>
+          <a:prstGeom prst="rect">
+            <a:avLst/>
+          </a:prstGeom>
+          <a:solidFill>
+            <a:schemeClr val="bg1">
+              <a:lumMod val="95000"/>
+            </a:schemeClr>
+          </a:solidFill>
+          <a:ln w="12700">
+            <a:solidFill>
+              <a:schemeClr val="bg1">
+                <a:lumMod val="50000"/>
+              </a:schemeClr>
+            </a:solidFill>
+          </a:ln>
+        </p:spPr>
+        <p:style>
+          <a:lnRef idx="2">
+            <a:schemeClr val="accent1">
+              <a:shade val="50000"/>
+            </a:schemeClr>
+          </a:lnRef>
+          <a:fillRef idx="1">
+            <a:schemeClr val="accent1"/>
+          </a:fillRef>
+          <a:effectRef idx="0">
+            <a:schemeClr val="accent1"/>
+          </a:effectRef>
+          <a:fontRef idx="minor">
+            <a:schemeClr val="lt1"/>
+          </a:fontRef>
+        </p:style>
+        <p:txBody>
+          <a:bodyPr rtlCol="0" anchor="ctr"/>
+          <a:lstStyle/>
+          <a:p>
+            <a:pPr algn="ctr"/>
+            <a:r>
+              <a:rPr lang="de-CH" sz="1000" dirty="0" err="1" smtClean="0">
+                <a:solidFill>
+                  <a:schemeClr val="tx1"/>
+                </a:solidFill>
+              </a:rPr>
+              <a:t>user.e</a:t>
+            </a:r>
+            <a:endParaRPr lang="en-US" sz="1000" dirty="0">
+              <a:solidFill>
+                <a:schemeClr val="tx1"/>
+              </a:solidFill>
+            </a:endParaRPr>
+          </a:p>
+        </p:txBody>
+      </p:sp>
+      <p:sp>
+        <p:nvSpPr>
+          <p:cNvPr id="47" name="Abgerundetes Rechteck 46"/>
+          <p:cNvSpPr/>
+          <p:nvPr/>
+        </p:nvSpPr>
+        <p:spPr>
+          <a:xfrm>
+            <a:off x="3286116" y="3071810"/>
+            <a:ext cx="1571636" cy="857256"/>
+          </a:xfrm>
+          <a:prstGeom prst="roundRect">
+            <a:avLst/>
+          </a:prstGeom>
+        </p:spPr>
+        <p:style>
+          <a:lnRef idx="2">
+            <a:schemeClr val="accent6">
+              <a:shade val="50000"/>
+            </a:schemeClr>
+          </a:lnRef>
+          <a:fillRef idx="1">
+            <a:schemeClr val="accent6"/>
+          </a:fillRef>
+          <a:effectRef idx="0">
+            <a:schemeClr val="accent6"/>
+          </a:effectRef>
+          <a:fontRef idx="minor">
+            <a:schemeClr val="lt1"/>
+          </a:fontRef>
+        </p:style>
+        <p:txBody>
+          <a:bodyPr rtlCol="0" anchor="ctr"/>
+          <a:lstStyle/>
+          <a:p>
+            <a:pPr algn="ctr"/>
+            <a:r>
+              <a:rPr lang="de-CH" dirty="0" err="1" smtClean="0"/>
+              <a:t>Xebra</a:t>
+            </a:r>
+            <a:r>
+              <a:rPr lang="de-CH" dirty="0" smtClean="0"/>
+              <a:t> Server</a:t>
+            </a:r>
+          </a:p>
+          <a:p>
+            <a:pPr algn="ctr"/>
+            <a:endParaRPr lang="en-US" dirty="0"/>
+          </a:p>
+        </p:txBody>
+      </p:sp>
+      <p:sp>
+        <p:nvSpPr>
+          <p:cNvPr id="48" name="Pfeil nach unten 47"/>
+          <p:cNvSpPr/>
+          <p:nvPr/>
+        </p:nvSpPr>
+        <p:spPr>
+          <a:xfrm rot="5400000">
+            <a:off x="5286380" y="2786058"/>
+            <a:ext cx="500066" cy="1214446"/>
           </a:xfrm>
           <a:prstGeom prst="downArrow">
             <a:avLst/>
@@ -3823,52 +4091,112 @@
           </a:p>
         </p:txBody>
       </p:sp>
-      <p:cxnSp>
-        <p:nvCxnSpPr>
-          <p:cNvPr id="33" name="Gerade Verbindung 32"/>
-          <p:cNvCxnSpPr>
-            <a:endCxn id="30" idx="2"/>
-          </p:cNvCxnSpPr>
+      <p:sp>
+        <p:nvSpPr>
+          <p:cNvPr id="49" name="Pfeil nach unten 48"/>
+          <p:cNvSpPr/>
           <p:nvPr/>
-        </p:nvCxnSpPr>
-        <p:spPr>
-          <a:xfrm>
-            <a:off x="3071802" y="1785926"/>
-            <a:ext cx="357158" cy="1588"/>
-          </a:xfrm>
-          <a:prstGeom prst="line">
+        </p:nvSpPr>
+        <p:spPr>
+          <a:xfrm rot="16200000">
+            <a:off x="2357422" y="2786058"/>
+            <a:ext cx="500066" cy="1214446"/>
+          </a:xfrm>
+          <a:prstGeom prst="downArrow">
             <a:avLst/>
           </a:prstGeom>
         </p:spPr>
         <p:style>
-          <a:lnRef idx="1">
-            <a:schemeClr val="dk1"/>
+          <a:lnRef idx="2">
+            <a:schemeClr val="accent5">
+              <a:shade val="50000"/>
+            </a:schemeClr>
           </a:lnRef>
-          <a:fillRef idx="0">
-            <a:schemeClr val="dk1"/>
+          <a:fillRef idx="1">
+            <a:schemeClr val="accent5"/>
           </a:fillRef>
           <a:effectRef idx="0">
-            <a:schemeClr val="dk1"/>
+            <a:schemeClr val="accent5"/>
           </a:effectRef>
           <a:fontRef idx="minor">
-            <a:schemeClr val="tx1"/>
+            <a:schemeClr val="lt1"/>
           </a:fontRef>
         </p:style>
-      </p:cxnSp>
-      <p:sp>
-        <p:nvSpPr>
-          <p:cNvPr id="35" name="Abgerundetes Rechteck 34"/>
+        <p:txBody>
+          <a:bodyPr rtlCol="0" anchor="ctr"/>
+          <a:lstStyle/>
+          <a:p>
+            <a:pPr algn="ctr"/>
+            <a:endParaRPr lang="en-US" dirty="0"/>
+          </a:p>
+        </p:txBody>
+      </p:sp>
+      <p:sp>
+        <p:nvSpPr>
+          <p:cNvPr id="50" name="Pfeil nach unten 49"/>
           <p:cNvSpPr/>
           <p:nvPr/>
         </p:nvSpPr>
         <p:spPr>
           <a:xfrm>
-            <a:off x="3143240" y="2571744"/>
-            <a:ext cx="1785950" cy="357190"/>
-          </a:xfrm>
-          <a:prstGeom prst="roundRect">
+            <a:off x="3786182" y="4143380"/>
+            <a:ext cx="500066" cy="714380"/>
+          </a:xfrm>
+          <a:prstGeom prst="downArrow">
             <a:avLst/>
           </a:prstGeom>
+        </p:spPr>
+        <p:style>
+          <a:lnRef idx="2">
+            <a:schemeClr val="accent5">
+              <a:shade val="50000"/>
+            </a:schemeClr>
+          </a:lnRef>
+          <a:fillRef idx="1">
+            <a:schemeClr val="accent5"/>
+          </a:fillRef>
+          <a:effectRef idx="0">
+            <a:schemeClr val="accent5"/>
+          </a:effectRef>
+          <a:fontRef idx="minor">
+            <a:schemeClr val="lt1"/>
+          </a:fontRef>
+        </p:style>
+        <p:txBody>
+          <a:bodyPr rtlCol="0" anchor="ctr"/>
+          <a:lstStyle/>
+          <a:p>
+            <a:pPr algn="ctr"/>
+            <a:endParaRPr lang="en-US" dirty="0"/>
+          </a:p>
+        </p:txBody>
+      </p:sp>
+      <p:sp>
+        <p:nvSpPr>
+          <p:cNvPr id="51" name="Rechteck 50"/>
+          <p:cNvSpPr/>
+          <p:nvPr/>
+        </p:nvSpPr>
+        <p:spPr>
+          <a:xfrm>
+            <a:off x="3428992" y="4929198"/>
+            <a:ext cx="1214446" cy="285752"/>
+          </a:xfrm>
+          <a:prstGeom prst="rect">
+            <a:avLst/>
+          </a:prstGeom>
+          <a:solidFill>
+            <a:schemeClr val="bg1">
+              <a:lumMod val="95000"/>
+            </a:schemeClr>
+          </a:solidFill>
+          <a:ln w="12700">
+            <a:solidFill>
+              <a:schemeClr val="bg1">
+                <a:lumMod val="50000"/>
+              </a:schemeClr>
+            </a:solidFill>
+          </a:ln>
         </p:spPr>
         <p:style>
           <a:lnRef idx="2">
@@ -3892,43 +4220,36 @@
           <a:p>
             <a:pPr algn="ctr"/>
             <a:r>
-              <a:rPr lang="de-CH" dirty="0" err="1" smtClean="0"/>
-              <a:t>XEbra</a:t>
-            </a:r>
-            <a:r>
-              <a:rPr lang="de-CH" dirty="0" smtClean="0"/>
-              <a:t> </a:t>
-            </a:r>
-            <a:r>
-              <a:rPr lang="de-CH" dirty="0" err="1" smtClean="0"/>
-              <a:t>Translator</a:t>
-            </a:r>
-            <a:endParaRPr lang="de-CH" dirty="0" smtClean="0"/>
-          </a:p>
-        </p:txBody>
-      </p:sp>
-      <p:sp>
-        <p:nvSpPr>
-          <p:cNvPr id="38" name="Rechteck 37"/>
+              <a:rPr lang="de-CH" sz="1000" dirty="0" smtClean="0">
+                <a:solidFill>
+                  <a:schemeClr val="tx1"/>
+                </a:solidFill>
+              </a:rPr>
+              <a:t>your_webapp.exe</a:t>
+            </a:r>
+            <a:endParaRPr lang="en-US" sz="1000" dirty="0">
+              <a:solidFill>
+                <a:schemeClr val="tx1"/>
+              </a:solidFill>
+            </a:endParaRPr>
+          </a:p>
+        </p:txBody>
+      </p:sp>
+      <p:sp>
+        <p:nvSpPr>
+          <p:cNvPr id="53" name="Abgerundetes Rechteck 52"/>
           <p:cNvSpPr/>
           <p:nvPr/>
         </p:nvSpPr>
         <p:spPr>
           <a:xfrm>
-            <a:off x="642910" y="2357430"/>
-            <a:ext cx="2428892" cy="2357454"/>
-          </a:xfrm>
-          <a:prstGeom prst="rect">
+            <a:off x="4071934" y="3786190"/>
+            <a:ext cx="1071570" cy="276228"/>
+          </a:xfrm>
+          <a:prstGeom prst="roundRect">
             <a:avLst/>
           </a:prstGeom>
-          <a:solidFill>
-            <a:schemeClr val="bg1"/>
-          </a:solidFill>
-          <a:ln w="3175">
-            <a:solidFill>
-              <a:schemeClr val="tx1"/>
-            </a:solidFill>
-          </a:ln>
+          <a:ln w="9525"/>
         </p:spPr>
         <p:style>
           <a:lnRef idx="2">
@@ -3950,692 +4271,42 @@
           <a:bodyPr rtlCol="0" anchor="ctr"/>
           <a:lstStyle/>
           <a:p>
-            <a:r>
-              <a:rPr lang="en-US" sz="900" b="1" dirty="0" smtClean="0">
-                <a:solidFill>
-                  <a:schemeClr val="tx2">
-                    <a:lumMod val="75000"/>
-                  </a:schemeClr>
-                </a:solidFill>
-                <a:latin typeface="Mongolian Baiti" pitchFamily="66" charset="0"/>
-                <a:cs typeface="Mongolian Baiti" pitchFamily="66" charset="0"/>
-              </a:rPr>
-              <a:t>class</a:t>
-            </a:r>
-          </a:p>
-          <a:p>
-            <a:r>
-              <a:rPr lang="en-US" sz="900" dirty="0" smtClean="0">
-                <a:solidFill>
-                  <a:schemeClr val="tx2">
-                    <a:lumMod val="75000"/>
-                  </a:schemeClr>
-                </a:solidFill>
-                <a:latin typeface="Mongolian Baiti" pitchFamily="66" charset="0"/>
-                <a:cs typeface="Mongolian Baiti" pitchFamily="66" charset="0"/>
-              </a:rPr>
-              <a:t>  </a:t>
-            </a:r>
-            <a:r>
-              <a:rPr lang="en-US" sz="900" dirty="0" smtClean="0">
-                <a:solidFill>
-                  <a:schemeClr val="tx2">
-                    <a:lumMod val="75000"/>
-                  </a:schemeClr>
-                </a:solidFill>
-                <a:latin typeface="Mongolian Baiti" pitchFamily="66" charset="0"/>
-                <a:cs typeface="Mongolian Baiti" pitchFamily="66" charset="0"/>
-              </a:rPr>
-              <a:t>   HI_SERVLET</a:t>
-            </a:r>
-            <a:endParaRPr lang="en-US" sz="900" dirty="0" smtClean="0">
-              <a:solidFill>
-                <a:schemeClr val="tx2">
-                  <a:lumMod val="75000"/>
-                </a:schemeClr>
-              </a:solidFill>
-              <a:latin typeface="Mongolian Baiti" pitchFamily="66" charset="0"/>
-              <a:cs typeface="Mongolian Baiti" pitchFamily="66" charset="0"/>
-            </a:endParaRPr>
-          </a:p>
-          <a:p>
-            <a:r>
-              <a:rPr lang="en-US" sz="900" b="1" dirty="0" smtClean="0">
-                <a:solidFill>
-                  <a:schemeClr val="tx2">
-                    <a:lumMod val="75000"/>
-                  </a:schemeClr>
-                </a:solidFill>
-                <a:latin typeface="Mongolian Baiti" pitchFamily="66" charset="0"/>
-                <a:cs typeface="Mongolian Baiti" pitchFamily="66" charset="0"/>
-              </a:rPr>
-              <a:t>inherit</a:t>
-            </a:r>
-          </a:p>
-          <a:p>
-            <a:r>
-              <a:rPr lang="en-US" sz="900" dirty="0" smtClean="0">
-                <a:solidFill>
-                  <a:schemeClr val="tx2">
-                    <a:lumMod val="75000"/>
-                  </a:schemeClr>
-                </a:solidFill>
-                <a:latin typeface="Mongolian Baiti" pitchFamily="66" charset="0"/>
-                <a:cs typeface="Mongolian Baiti" pitchFamily="66" charset="0"/>
-              </a:rPr>
-              <a:t> </a:t>
-            </a:r>
-            <a:r>
-              <a:rPr lang="en-US" sz="900" dirty="0" smtClean="0">
-                <a:solidFill>
-                  <a:schemeClr val="tx2">
-                    <a:lumMod val="75000"/>
-                  </a:schemeClr>
-                </a:solidFill>
-                <a:latin typeface="Mongolian Baiti" pitchFamily="66" charset="0"/>
-                <a:cs typeface="Mongolian Baiti" pitchFamily="66" charset="0"/>
-              </a:rPr>
-              <a:t>    XB_SERVLET</a:t>
-            </a:r>
-            <a:endParaRPr lang="en-US" sz="900" dirty="0" smtClean="0">
-              <a:solidFill>
-                <a:schemeClr val="tx2">
-                  <a:lumMod val="75000"/>
-                </a:schemeClr>
-              </a:solidFill>
-              <a:latin typeface="Mongolian Baiti" pitchFamily="66" charset="0"/>
-              <a:cs typeface="Mongolian Baiti" pitchFamily="66" charset="0"/>
-            </a:endParaRPr>
-          </a:p>
-          <a:p>
-            <a:r>
-              <a:rPr lang="en-US" sz="900" b="1" dirty="0" smtClean="0">
-                <a:solidFill>
-                  <a:schemeClr val="tx2">
-                    <a:lumMod val="75000"/>
-                  </a:schemeClr>
-                </a:solidFill>
-                <a:latin typeface="Mongolian Baiti" pitchFamily="66" charset="0"/>
-                <a:cs typeface="Mongolian Baiti" pitchFamily="66" charset="0"/>
-              </a:rPr>
-              <a:t>feature</a:t>
-            </a:r>
-            <a:r>
-              <a:rPr lang="en-US" sz="900" dirty="0" smtClean="0">
-                <a:solidFill>
-                  <a:schemeClr val="tx2">
-                    <a:lumMod val="75000"/>
-                  </a:schemeClr>
-                </a:solidFill>
-                <a:latin typeface="Mongolian Baiti" pitchFamily="66" charset="0"/>
-                <a:cs typeface="Mongolian Baiti" pitchFamily="66" charset="0"/>
-              </a:rPr>
-              <a:t> -- Service</a:t>
-            </a:r>
-          </a:p>
-          <a:p>
-            <a:r>
-              <a:rPr lang="en-US" sz="900" dirty="0" smtClean="0">
-                <a:solidFill>
-                  <a:schemeClr val="tx2">
-                    <a:lumMod val="75000"/>
-                  </a:schemeClr>
-                </a:solidFill>
-                <a:latin typeface="Mongolian Baiti" pitchFamily="66" charset="0"/>
-                <a:cs typeface="Mongolian Baiti" pitchFamily="66" charset="0"/>
-              </a:rPr>
-              <a:t>  </a:t>
-            </a:r>
-            <a:r>
-              <a:rPr lang="en-US" sz="900" dirty="0" smtClean="0">
-                <a:solidFill>
-                  <a:schemeClr val="tx2">
-                    <a:lumMod val="75000"/>
-                  </a:schemeClr>
-                </a:solidFill>
-                <a:latin typeface="Mongolian Baiti" pitchFamily="66" charset="0"/>
-                <a:cs typeface="Mongolian Baiti" pitchFamily="66" charset="0"/>
-              </a:rPr>
-              <a:t>   </a:t>
-            </a:r>
-            <a:r>
-              <a:rPr lang="en-US" sz="900" dirty="0" err="1" smtClean="0">
-                <a:solidFill>
-                  <a:schemeClr val="tx2">
-                    <a:lumMod val="75000"/>
-                  </a:schemeClr>
-                </a:solidFill>
-                <a:latin typeface="Mongolian Baiti" pitchFamily="66" charset="0"/>
-                <a:cs typeface="Mongolian Baiti" pitchFamily="66" charset="0"/>
-              </a:rPr>
-              <a:t>handle_request</a:t>
-            </a:r>
-            <a:r>
-              <a:rPr lang="en-US" sz="900" dirty="0" smtClean="0">
-                <a:solidFill>
-                  <a:schemeClr val="tx2">
-                    <a:lumMod val="75000"/>
-                  </a:schemeClr>
-                </a:solidFill>
-                <a:latin typeface="Mongolian Baiti" pitchFamily="66" charset="0"/>
-                <a:cs typeface="Mongolian Baiti" pitchFamily="66" charset="0"/>
-              </a:rPr>
-              <a:t> </a:t>
-            </a:r>
-            <a:r>
-              <a:rPr lang="en-US" sz="900" dirty="0" smtClean="0">
-                <a:solidFill>
-                  <a:schemeClr val="tx2">
-                    <a:lumMod val="75000"/>
-                  </a:schemeClr>
-                </a:solidFill>
-                <a:latin typeface="Mongolian Baiti" pitchFamily="66" charset="0"/>
-                <a:cs typeface="Mongolian Baiti" pitchFamily="66" charset="0"/>
-              </a:rPr>
-              <a:t>(request: </a:t>
-            </a:r>
-            <a:r>
-              <a:rPr lang="en-US" sz="700" dirty="0" smtClean="0">
-                <a:solidFill>
-                  <a:schemeClr val="tx2">
-                    <a:lumMod val="75000"/>
-                  </a:schemeClr>
-                </a:solidFill>
-                <a:latin typeface="Mongolian Baiti" pitchFamily="66" charset="0"/>
-                <a:cs typeface="Mongolian Baiti" pitchFamily="66" charset="0"/>
-              </a:rPr>
-              <a:t>REQUEST</a:t>
-            </a:r>
-            <a:r>
-              <a:rPr lang="en-US" sz="900" dirty="0" smtClean="0">
-                <a:solidFill>
-                  <a:schemeClr val="tx2">
-                    <a:lumMod val="75000"/>
-                  </a:schemeClr>
-                </a:solidFill>
-                <a:latin typeface="Mongolian Baiti" pitchFamily="66" charset="0"/>
-                <a:cs typeface="Mongolian Baiti" pitchFamily="66" charset="0"/>
-              </a:rPr>
-              <a:t>): </a:t>
-            </a:r>
-            <a:r>
-              <a:rPr lang="en-US" sz="700" dirty="0" smtClean="0">
-                <a:solidFill>
-                  <a:schemeClr val="tx2">
-                    <a:lumMod val="75000"/>
-                  </a:schemeClr>
-                </a:solidFill>
-                <a:latin typeface="Mongolian Baiti" pitchFamily="66" charset="0"/>
-                <a:cs typeface="Mongolian Baiti" pitchFamily="66" charset="0"/>
-              </a:rPr>
-              <a:t>RESPONSE</a:t>
-            </a:r>
-            <a:endParaRPr lang="en-US" sz="900" dirty="0" smtClean="0">
-              <a:solidFill>
-                <a:schemeClr val="tx2">
-                  <a:lumMod val="75000"/>
-                </a:schemeClr>
-              </a:solidFill>
-              <a:latin typeface="Mongolian Baiti" pitchFamily="66" charset="0"/>
-              <a:cs typeface="Mongolian Baiti" pitchFamily="66" charset="0"/>
-            </a:endParaRPr>
-          </a:p>
-          <a:p>
-            <a:r>
-              <a:rPr lang="en-US" sz="900" dirty="0" smtClean="0">
-                <a:solidFill>
-                  <a:schemeClr val="tx2">
-                    <a:lumMod val="75000"/>
-                  </a:schemeClr>
-                </a:solidFill>
-                <a:latin typeface="Mongolian Baiti" pitchFamily="66" charset="0"/>
-                <a:cs typeface="Mongolian Baiti" pitchFamily="66" charset="0"/>
-              </a:rPr>
-              <a:t>         </a:t>
-            </a:r>
-            <a:r>
-              <a:rPr lang="en-US" sz="900" b="1" dirty="0" smtClean="0">
-                <a:solidFill>
-                  <a:schemeClr val="tx2">
-                    <a:lumMod val="75000"/>
-                  </a:schemeClr>
-                </a:solidFill>
-                <a:latin typeface="Mongolian Baiti" pitchFamily="66" charset="0"/>
-                <a:cs typeface="Mongolian Baiti" pitchFamily="66" charset="0"/>
-              </a:rPr>
-              <a:t>do</a:t>
-            </a:r>
-            <a:endParaRPr lang="en-US" sz="900" b="1" dirty="0" smtClean="0">
-              <a:solidFill>
-                <a:schemeClr val="tx2">
-                  <a:lumMod val="75000"/>
-                </a:schemeClr>
-              </a:solidFill>
-              <a:latin typeface="Mongolian Baiti" pitchFamily="66" charset="0"/>
-              <a:cs typeface="Mongolian Baiti" pitchFamily="66" charset="0"/>
-            </a:endParaRPr>
-          </a:p>
-          <a:p>
-            <a:r>
-              <a:rPr lang="en-US" sz="900" dirty="0" smtClean="0">
-                <a:solidFill>
-                  <a:schemeClr val="tx2">
-                    <a:lumMod val="75000"/>
-                  </a:schemeClr>
-                </a:solidFill>
-                <a:latin typeface="Mongolian Baiti" pitchFamily="66" charset="0"/>
-                <a:cs typeface="Mongolian Baiti" pitchFamily="66" charset="0"/>
-              </a:rPr>
-              <a:t>      </a:t>
-            </a:r>
-            <a:r>
-              <a:rPr lang="en-US" sz="900" dirty="0" smtClean="0">
-                <a:solidFill>
-                  <a:schemeClr val="tx2">
-                    <a:lumMod val="75000"/>
-                  </a:schemeClr>
-                </a:solidFill>
-                <a:latin typeface="Mongolian Baiti" pitchFamily="66" charset="0"/>
-                <a:cs typeface="Mongolian Baiti" pitchFamily="66" charset="0"/>
-              </a:rPr>
-              <a:t>        create </a:t>
-            </a:r>
-            <a:r>
-              <a:rPr lang="en-US" sz="900" b="1" dirty="0" err="1" smtClean="0">
-                <a:solidFill>
-                  <a:schemeClr val="tx2">
-                    <a:lumMod val="75000"/>
-                  </a:schemeClr>
-                </a:solidFill>
-                <a:latin typeface="Mongolian Baiti" pitchFamily="66" charset="0"/>
-                <a:cs typeface="Mongolian Baiti" pitchFamily="66" charset="0"/>
-              </a:rPr>
-              <a:t>Result</a:t>
-            </a:r>
-            <a:r>
-              <a:rPr lang="en-US" sz="900" dirty="0" err="1" smtClean="0">
-                <a:solidFill>
-                  <a:schemeClr val="tx2">
-                    <a:lumMod val="75000"/>
-                  </a:schemeClr>
-                </a:solidFill>
-                <a:latin typeface="Mongolian Baiti" pitchFamily="66" charset="0"/>
-                <a:cs typeface="Mongolian Baiti" pitchFamily="66" charset="0"/>
-              </a:rPr>
-              <a:t>.make</a:t>
-            </a:r>
-            <a:endParaRPr lang="en-US" sz="900" dirty="0" smtClean="0">
-              <a:solidFill>
-                <a:schemeClr val="tx2">
-                  <a:lumMod val="75000"/>
-                </a:schemeClr>
-              </a:solidFill>
-              <a:latin typeface="Mongolian Baiti" pitchFamily="66" charset="0"/>
-              <a:cs typeface="Mongolian Baiti" pitchFamily="66" charset="0"/>
-            </a:endParaRPr>
-          </a:p>
-          <a:p>
-            <a:r>
-              <a:rPr lang="en-US" sz="900" dirty="0" smtClean="0">
-                <a:solidFill>
-                  <a:schemeClr val="tx2">
-                    <a:lumMod val="75000"/>
-                  </a:schemeClr>
-                </a:solidFill>
-                <a:latin typeface="Mongolian Baiti" pitchFamily="66" charset="0"/>
-                <a:cs typeface="Mongolian Baiti" pitchFamily="66" charset="0"/>
-              </a:rPr>
-              <a:t> </a:t>
-            </a:r>
-            <a:r>
-              <a:rPr lang="en-US" sz="900" dirty="0" smtClean="0">
-                <a:solidFill>
-                  <a:schemeClr val="tx2">
-                    <a:lumMod val="75000"/>
-                  </a:schemeClr>
-                </a:solidFill>
-                <a:latin typeface="Mongolian Baiti" pitchFamily="66" charset="0"/>
-                <a:cs typeface="Mongolian Baiti" pitchFamily="66" charset="0"/>
-              </a:rPr>
-              <a:t>             </a:t>
-            </a:r>
-            <a:r>
-              <a:rPr lang="en-US" sz="900" b="1" dirty="0" err="1" smtClean="0">
-                <a:solidFill>
-                  <a:schemeClr val="tx2">
-                    <a:lumMod val="75000"/>
-                  </a:schemeClr>
-                </a:solidFill>
-                <a:latin typeface="Mongolian Baiti" pitchFamily="66" charset="0"/>
-                <a:cs typeface="Mongolian Baiti" pitchFamily="66" charset="0"/>
-              </a:rPr>
-              <a:t>Result</a:t>
-            </a:r>
-            <a:r>
-              <a:rPr lang="en-US" sz="900" dirty="0" err="1" smtClean="0">
-                <a:solidFill>
-                  <a:schemeClr val="tx2">
-                    <a:lumMod val="75000"/>
-                  </a:schemeClr>
-                </a:solidFill>
-                <a:latin typeface="Mongolian Baiti" pitchFamily="66" charset="0"/>
-                <a:cs typeface="Mongolian Baiti" pitchFamily="66" charset="0"/>
-              </a:rPr>
-              <a:t>.append</a:t>
-            </a:r>
-            <a:r>
-              <a:rPr lang="en-US" sz="900" dirty="0" smtClean="0">
-                <a:solidFill>
-                  <a:schemeClr val="tx2">
-                    <a:lumMod val="75000"/>
-                  </a:schemeClr>
-                </a:solidFill>
-                <a:latin typeface="Mongolian Baiti" pitchFamily="66" charset="0"/>
-                <a:cs typeface="Mongolian Baiti" pitchFamily="66" charset="0"/>
-              </a:rPr>
-              <a:t> ("&lt;</a:t>
-            </a:r>
-            <a:r>
-              <a:rPr lang="en-US" sz="900" dirty="0" smtClean="0">
-                <a:solidFill>
-                  <a:schemeClr val="tx2">
-                    <a:lumMod val="75000"/>
-                  </a:schemeClr>
-                </a:solidFill>
-                <a:latin typeface="Mongolian Baiti" pitchFamily="66" charset="0"/>
-                <a:cs typeface="Mongolian Baiti" pitchFamily="66" charset="0"/>
-              </a:rPr>
-              <a:t>h1&gt;Hi!&lt;h2&gt;")</a:t>
-            </a:r>
-          </a:p>
-          <a:p>
-            <a:r>
-              <a:rPr lang="en-US" sz="900" dirty="0" smtClean="0">
-                <a:solidFill>
-                  <a:schemeClr val="tx2">
-                    <a:lumMod val="75000"/>
-                  </a:schemeClr>
-                </a:solidFill>
-                <a:latin typeface="Mongolian Baiti" pitchFamily="66" charset="0"/>
-                <a:cs typeface="Mongolian Baiti" pitchFamily="66" charset="0"/>
-              </a:rPr>
-              <a:t>      </a:t>
-            </a:r>
-            <a:r>
-              <a:rPr lang="en-US" sz="900" dirty="0" smtClean="0">
-                <a:solidFill>
-                  <a:schemeClr val="tx2">
-                    <a:lumMod val="75000"/>
-                  </a:schemeClr>
-                </a:solidFill>
-                <a:latin typeface="Mongolian Baiti" pitchFamily="66" charset="0"/>
-                <a:cs typeface="Mongolian Baiti" pitchFamily="66" charset="0"/>
-              </a:rPr>
-              <a:t>        </a:t>
-            </a:r>
-            <a:r>
-              <a:rPr lang="en-US" sz="900" b="1" dirty="0" err="1" smtClean="0">
-                <a:solidFill>
-                  <a:schemeClr val="tx2">
-                    <a:lumMod val="75000"/>
-                  </a:schemeClr>
-                </a:solidFill>
-                <a:latin typeface="Mongolian Baiti" pitchFamily="66" charset="0"/>
-                <a:cs typeface="Mongolian Baiti" pitchFamily="66" charset="0"/>
-              </a:rPr>
-              <a:t>Result</a:t>
-            </a:r>
-            <a:r>
-              <a:rPr lang="en-US" sz="900" dirty="0" err="1" smtClean="0">
-                <a:solidFill>
-                  <a:schemeClr val="tx2">
-                    <a:lumMod val="75000"/>
-                  </a:schemeClr>
-                </a:solidFill>
-                <a:latin typeface="Mongolian Baiti" pitchFamily="66" charset="0"/>
-                <a:cs typeface="Mongolian Baiti" pitchFamily="66" charset="0"/>
-              </a:rPr>
-              <a:t>.append</a:t>
-            </a:r>
-            <a:r>
-              <a:rPr lang="en-US" sz="900" dirty="0" smtClean="0">
-                <a:solidFill>
-                  <a:schemeClr val="tx2">
-                    <a:lumMod val="75000"/>
-                  </a:schemeClr>
-                </a:solidFill>
-                <a:latin typeface="Mongolian Baiti" pitchFamily="66" charset="0"/>
-                <a:cs typeface="Mongolian Baiti" pitchFamily="66" charset="0"/>
-              </a:rPr>
-              <a:t> </a:t>
-            </a:r>
-            <a:r>
-              <a:rPr lang="en-US" sz="900" dirty="0" smtClean="0">
-                <a:solidFill>
-                  <a:schemeClr val="tx2">
-                    <a:lumMod val="75000"/>
-                  </a:schemeClr>
-                </a:solidFill>
-                <a:latin typeface="Mongolian Baiti" pitchFamily="66" charset="0"/>
-                <a:cs typeface="Mongolian Baiti" pitchFamily="66" charset="0"/>
-              </a:rPr>
-              <a:t>(</a:t>
-            </a:r>
-            <a:r>
-              <a:rPr lang="en-US" sz="900" dirty="0" err="1" smtClean="0">
-                <a:solidFill>
-                  <a:schemeClr val="tx2">
-                    <a:lumMod val="75000"/>
-                  </a:schemeClr>
-                </a:solidFill>
-                <a:latin typeface="Mongolian Baiti" pitchFamily="66" charset="0"/>
-                <a:cs typeface="Mongolian Baiti" pitchFamily="66" charset="0"/>
-              </a:rPr>
-              <a:t>controller.say_hi</a:t>
-            </a:r>
-            <a:r>
-              <a:rPr lang="en-US" sz="900" dirty="0" smtClean="0">
-                <a:solidFill>
-                  <a:schemeClr val="tx2">
-                    <a:lumMod val="75000"/>
-                  </a:schemeClr>
-                </a:solidFill>
-                <a:latin typeface="Mongolian Baiti" pitchFamily="66" charset="0"/>
-                <a:cs typeface="Mongolian Baiti" pitchFamily="66" charset="0"/>
-              </a:rPr>
-              <a:t>)</a:t>
-            </a:r>
-          </a:p>
-          <a:p>
-            <a:r>
-              <a:rPr lang="en-US" sz="900" dirty="0" smtClean="0">
-                <a:solidFill>
-                  <a:schemeClr val="tx2">
-                    <a:lumMod val="75000"/>
-                  </a:schemeClr>
-                </a:solidFill>
-                <a:latin typeface="Mongolian Baiti" pitchFamily="66" charset="0"/>
-                <a:cs typeface="Mongolian Baiti" pitchFamily="66" charset="0"/>
-              </a:rPr>
-              <a:t>      </a:t>
-            </a:r>
-            <a:r>
-              <a:rPr lang="en-US" sz="900" dirty="0" smtClean="0">
-                <a:solidFill>
-                  <a:schemeClr val="tx2">
-                    <a:lumMod val="75000"/>
-                  </a:schemeClr>
-                </a:solidFill>
-                <a:latin typeface="Mongolian Baiti" pitchFamily="66" charset="0"/>
-                <a:cs typeface="Mongolian Baiti" pitchFamily="66" charset="0"/>
-              </a:rPr>
-              <a:t>        </a:t>
-            </a:r>
-            <a:r>
-              <a:rPr lang="en-US" sz="900" b="1" dirty="0" err="1" smtClean="0">
-                <a:solidFill>
-                  <a:schemeClr val="tx2">
-                    <a:lumMod val="75000"/>
-                  </a:schemeClr>
-                </a:solidFill>
-                <a:latin typeface="Mongolian Baiti" pitchFamily="66" charset="0"/>
-                <a:cs typeface="Mongolian Baiti" pitchFamily="66" charset="0"/>
-              </a:rPr>
-              <a:t>Result</a:t>
-            </a:r>
-            <a:r>
-              <a:rPr lang="en-US" sz="900" dirty="0" err="1" smtClean="0">
-                <a:solidFill>
-                  <a:schemeClr val="tx2">
-                    <a:lumMod val="75000"/>
-                  </a:schemeClr>
-                </a:solidFill>
-                <a:latin typeface="Mongolian Baiti" pitchFamily="66" charset="0"/>
-                <a:cs typeface="Mongolian Baiti" pitchFamily="66" charset="0"/>
-              </a:rPr>
-              <a:t>.append</a:t>
-            </a:r>
-            <a:r>
-              <a:rPr lang="en-US" sz="900" dirty="0" smtClean="0">
-                <a:solidFill>
-                  <a:schemeClr val="tx2">
-                    <a:lumMod val="75000"/>
-                  </a:schemeClr>
-                </a:solidFill>
-                <a:latin typeface="Mongolian Baiti" pitchFamily="66" charset="0"/>
-                <a:cs typeface="Mongolian Baiti" pitchFamily="66" charset="0"/>
-              </a:rPr>
-              <a:t> </a:t>
-            </a:r>
-            <a:r>
-              <a:rPr lang="en-US" sz="900" dirty="0" smtClean="0">
-                <a:solidFill>
-                  <a:schemeClr val="tx2">
-                    <a:lumMod val="75000"/>
-                  </a:schemeClr>
-                </a:solidFill>
-                <a:latin typeface="Mongolian Baiti" pitchFamily="66" charset="0"/>
-                <a:cs typeface="Mongolian Baiti" pitchFamily="66" charset="0"/>
-              </a:rPr>
-              <a:t>("&lt;/body&gt;&lt;/html&gt;")</a:t>
-            </a:r>
-          </a:p>
-          <a:p>
-            <a:r>
-              <a:rPr lang="en-US" sz="900" b="1" dirty="0" smtClean="0">
-                <a:solidFill>
-                  <a:schemeClr val="tx2">
-                    <a:lumMod val="75000"/>
-                  </a:schemeClr>
-                </a:solidFill>
-                <a:latin typeface="Mongolian Baiti" pitchFamily="66" charset="0"/>
-                <a:cs typeface="Mongolian Baiti" pitchFamily="66" charset="0"/>
-              </a:rPr>
-              <a:t>         end</a:t>
-            </a:r>
-            <a:endParaRPr lang="en-US" sz="900" b="1" dirty="0" smtClean="0">
-              <a:solidFill>
-                <a:schemeClr val="tx2">
-                  <a:lumMod val="75000"/>
-                </a:schemeClr>
-              </a:solidFill>
-              <a:latin typeface="Mongolian Baiti" pitchFamily="66" charset="0"/>
-              <a:cs typeface="Mongolian Baiti" pitchFamily="66" charset="0"/>
-            </a:endParaRPr>
-          </a:p>
-          <a:p>
-            <a:r>
-              <a:rPr lang="en-US" sz="900" b="1" dirty="0" smtClean="0">
-                <a:solidFill>
-                  <a:schemeClr val="tx2">
-                    <a:lumMod val="75000"/>
-                  </a:schemeClr>
-                </a:solidFill>
-                <a:latin typeface="Mongolian Baiti" pitchFamily="66" charset="0"/>
-                <a:cs typeface="Mongolian Baiti" pitchFamily="66" charset="0"/>
-              </a:rPr>
-              <a:t>end</a:t>
-            </a:r>
-            <a:r>
-              <a:rPr lang="en-US" sz="900" dirty="0" smtClean="0">
-                <a:solidFill>
-                  <a:schemeClr val="tx2">
-                    <a:lumMod val="75000"/>
-                  </a:schemeClr>
-                </a:solidFill>
-                <a:latin typeface="Mongolian Baiti" pitchFamily="66" charset="0"/>
-                <a:cs typeface="Mongolian Baiti" pitchFamily="66" charset="0"/>
-              </a:rPr>
-              <a:t>	</a:t>
-            </a:r>
-            <a:endParaRPr lang="en-US" sz="900" dirty="0">
-              <a:solidFill>
-                <a:schemeClr val="tx2">
-                  <a:lumMod val="75000"/>
-                </a:schemeClr>
-              </a:solidFill>
-              <a:latin typeface="Mongolian Baiti" pitchFamily="66" charset="0"/>
-              <a:cs typeface="Mongolian Baiti" pitchFamily="66" charset="0"/>
-            </a:endParaRPr>
-          </a:p>
-        </p:txBody>
-      </p:sp>
-      <p:cxnSp>
-        <p:nvCxnSpPr>
-          <p:cNvPr id="39" name="Gerade Verbindung 38"/>
-          <p:cNvCxnSpPr/>
-          <p:nvPr/>
-        </p:nvCxnSpPr>
-        <p:spPr>
-          <a:xfrm>
-            <a:off x="3071802" y="4071942"/>
-            <a:ext cx="285752" cy="1588"/>
-          </a:xfrm>
-          <a:prstGeom prst="line">
-            <a:avLst/>
-          </a:prstGeom>
-        </p:spPr>
-        <p:style>
-          <a:lnRef idx="1">
-            <a:schemeClr val="dk1"/>
-          </a:lnRef>
-          <a:fillRef idx="0">
-            <a:schemeClr val="dk1"/>
-          </a:fillRef>
-          <a:effectRef idx="0">
-            <a:schemeClr val="dk1"/>
-          </a:effectRef>
-          <a:fontRef idx="minor">
-            <a:schemeClr val="tx1"/>
-          </a:fontRef>
-        </p:style>
-      </p:cxnSp>
-      <p:sp>
-        <p:nvSpPr>
-          <p:cNvPr id="42" name="Abgerundetes Rechteck 41"/>
+            <a:pPr algn="ctr"/>
+            <a:r>
+              <a:rPr lang="de-CH" sz="1000" dirty="0" smtClean="0"/>
+              <a:t>Eiffel Compiler</a:t>
+            </a:r>
+            <a:endParaRPr lang="de-CH" sz="1000" dirty="0" smtClean="0"/>
+          </a:p>
+        </p:txBody>
+      </p:sp>
+      <p:sp>
+        <p:nvSpPr>
+          <p:cNvPr id="55" name="Abgerundetes Rechteck 54"/>
           <p:cNvSpPr/>
           <p:nvPr/>
         </p:nvSpPr>
         <p:spPr>
           <a:xfrm>
-            <a:off x="7143768" y="3714752"/>
-            <a:ext cx="1714512" cy="857256"/>
+            <a:off x="2928926" y="3786190"/>
+            <a:ext cx="1071570" cy="276228"/>
           </a:xfrm>
           <a:prstGeom prst="roundRect">
             <a:avLst/>
           </a:prstGeom>
+          <a:ln w="9525"/>
         </p:spPr>
         <p:style>
           <a:lnRef idx="2">
-            <a:schemeClr val="accent1">
+            <a:schemeClr val="accent6">
               <a:shade val="50000"/>
             </a:schemeClr>
           </a:lnRef>
           <a:fillRef idx="1">
-            <a:schemeClr val="accent1"/>
+            <a:schemeClr val="accent6"/>
           </a:fillRef>
           <a:effectRef idx="0">
-            <a:schemeClr val="accent1"/>
+            <a:schemeClr val="accent6"/>
           </a:effectRef>
           <a:fontRef idx="minor">
             <a:schemeClr val="lt1"/>
@@ -4647,603 +4318,18 @@
           <a:p>
             <a:pPr algn="ctr"/>
             <a:r>
-              <a:rPr lang="de-CH" dirty="0" smtClean="0"/>
-              <a:t>Eiffel Compiler</a:t>
-            </a:r>
-          </a:p>
-        </p:txBody>
-      </p:sp>
-      <p:sp>
-        <p:nvSpPr>
-          <p:cNvPr id="43" name="Pfeil nach unten 42"/>
-          <p:cNvSpPr/>
-          <p:nvPr/>
-        </p:nvSpPr>
-        <p:spPr>
-          <a:xfrm>
-            <a:off x="3714712" y="3071810"/>
-            <a:ext cx="500066" cy="714380"/>
-          </a:xfrm>
-          <a:prstGeom prst="downArrow">
-            <a:avLst/>
-          </a:prstGeom>
-        </p:spPr>
-        <p:style>
-          <a:lnRef idx="2">
-            <a:schemeClr val="accent5">
-              <a:shade val="50000"/>
-            </a:schemeClr>
-          </a:lnRef>
-          <a:fillRef idx="1">
-            <a:schemeClr val="accent5"/>
-          </a:fillRef>
-          <a:effectRef idx="0">
-            <a:schemeClr val="accent5"/>
-          </a:effectRef>
-          <a:fontRef idx="minor">
-            <a:schemeClr val="lt1"/>
-          </a:fontRef>
-        </p:style>
-        <p:txBody>
-          <a:bodyPr rtlCol="0" anchor="ctr"/>
-          <a:lstStyle/>
-          <a:p>
-            <a:pPr algn="ctr"/>
-            <a:endParaRPr lang="en-US" dirty="0"/>
-          </a:p>
-        </p:txBody>
-      </p:sp>
-      <p:sp>
-        <p:nvSpPr>
-          <p:cNvPr id="45" name="Textfeld 44"/>
-          <p:cNvSpPr txBox="1"/>
-          <p:nvPr/>
-        </p:nvSpPr>
-        <p:spPr>
-          <a:xfrm>
-            <a:off x="4357654" y="3071810"/>
-            <a:ext cx="1714512" cy="738664"/>
-          </a:xfrm>
-          <a:prstGeom prst="rect">
-            <a:avLst/>
-          </a:prstGeom>
-          <a:noFill/>
-        </p:spPr>
-        <p:txBody>
-          <a:bodyPr wrap="square" rtlCol="0">
-            <a:spAutoFit/>
-          </a:bodyPr>
-          <a:lstStyle/>
-          <a:p>
-            <a:r>
-              <a:rPr lang="de-CH" sz="1400" i="1" dirty="0" err="1" smtClean="0"/>
-              <a:t>Compile</a:t>
-            </a:r>
-            <a:r>
-              <a:rPr lang="de-CH" sz="1400" i="1" dirty="0" smtClean="0"/>
+              <a:rPr lang="de-CH" sz="1000" dirty="0" err="1" smtClean="0"/>
+              <a:t>Xebra</a:t>
+            </a:r>
+            <a:r>
+              <a:rPr lang="de-CH" sz="1000" dirty="0" smtClean="0"/>
               <a:t> </a:t>
             </a:r>
             <a:r>
-              <a:rPr lang="de-CH" sz="1400" i="1" dirty="0" err="1" smtClean="0"/>
-              <a:t>script</a:t>
-            </a:r>
-            <a:r>
-              <a:rPr lang="de-CH" sz="1400" i="1" dirty="0" smtClean="0"/>
-              <a:t> </a:t>
-            </a:r>
-            <a:r>
-              <a:rPr lang="de-CH" sz="1400" i="1" dirty="0" err="1" smtClean="0"/>
-              <a:t>and</a:t>
-            </a:r>
-            <a:r>
-              <a:rPr lang="de-CH" sz="1400" i="1" dirty="0" smtClean="0"/>
-              <a:t> </a:t>
-            </a:r>
-            <a:r>
-              <a:rPr lang="de-CH" sz="1400" i="1" dirty="0" err="1" smtClean="0"/>
-              <a:t>add</a:t>
-            </a:r>
-            <a:r>
-              <a:rPr lang="de-CH" sz="1400" i="1" dirty="0" smtClean="0"/>
-              <a:t> </a:t>
-            </a:r>
-            <a:r>
-              <a:rPr lang="de-CH" sz="1400" i="1" dirty="0" err="1" smtClean="0"/>
-              <a:t>it</a:t>
-            </a:r>
-            <a:r>
-              <a:rPr lang="de-CH" sz="1400" i="1" dirty="0" smtClean="0"/>
-              <a:t> </a:t>
-            </a:r>
-            <a:r>
-              <a:rPr lang="de-CH" sz="1400" i="1" dirty="0" err="1" smtClean="0"/>
-              <a:t>to</a:t>
-            </a:r>
-            <a:r>
-              <a:rPr lang="de-CH" sz="1400" i="1" dirty="0" smtClean="0"/>
-              <a:t> </a:t>
-            </a:r>
-            <a:r>
-              <a:rPr lang="de-CH" sz="1400" i="1" dirty="0" err="1" smtClean="0"/>
-              <a:t>the</a:t>
-            </a:r>
-            <a:r>
-              <a:rPr lang="de-CH" sz="1400" i="1" dirty="0" smtClean="0"/>
-              <a:t> </a:t>
-            </a:r>
-            <a:r>
-              <a:rPr lang="de-CH" sz="1400" i="1" dirty="0" err="1" smtClean="0"/>
-              <a:t>rest</a:t>
-            </a:r>
-            <a:r>
-              <a:rPr lang="de-CH" sz="1400" i="1" dirty="0" smtClean="0"/>
-              <a:t> </a:t>
-            </a:r>
-            <a:r>
-              <a:rPr lang="de-CH" sz="1400" i="1" dirty="0" err="1" smtClean="0"/>
-              <a:t>of</a:t>
-            </a:r>
-            <a:r>
-              <a:rPr lang="de-CH" sz="1400" i="1" dirty="0" smtClean="0"/>
-              <a:t> </a:t>
-            </a:r>
-            <a:r>
-              <a:rPr lang="de-CH" sz="1400" i="1" dirty="0" err="1" smtClean="0"/>
-              <a:t>the</a:t>
-            </a:r>
-            <a:r>
-              <a:rPr lang="de-CH" sz="1400" i="1" dirty="0" smtClean="0"/>
-              <a:t> web </a:t>
-            </a:r>
-            <a:r>
-              <a:rPr lang="de-CH" sz="1400" i="1" dirty="0" err="1" smtClean="0"/>
-              <a:t>application</a:t>
-            </a:r>
-            <a:endParaRPr lang="en-US" sz="1400" i="1" dirty="0"/>
-          </a:p>
-        </p:txBody>
-      </p:sp>
-      <p:sp>
-        <p:nvSpPr>
-          <p:cNvPr id="46" name="Textfeld 45"/>
-          <p:cNvSpPr txBox="1"/>
-          <p:nvPr/>
-        </p:nvSpPr>
-        <p:spPr>
-          <a:xfrm>
-            <a:off x="6072198" y="2357430"/>
-            <a:ext cx="1357322" cy="738664"/>
-          </a:xfrm>
-          <a:prstGeom prst="rect">
-            <a:avLst/>
-          </a:prstGeom>
-          <a:noFill/>
-        </p:spPr>
-        <p:txBody>
-          <a:bodyPr wrap="square" rtlCol="0">
-            <a:spAutoFit/>
-          </a:bodyPr>
-          <a:lstStyle/>
-          <a:p>
-            <a:r>
-              <a:rPr lang="de-CH" sz="1400" i="1" dirty="0" smtClean="0"/>
-              <a:t>Create </a:t>
-            </a:r>
-            <a:r>
-              <a:rPr lang="de-CH" sz="1400" i="1" dirty="0" err="1" smtClean="0"/>
-              <a:t>domain</a:t>
-            </a:r>
-            <a:r>
-              <a:rPr lang="de-CH" sz="1400" i="1" dirty="0" smtClean="0"/>
-              <a:t> </a:t>
-            </a:r>
-            <a:r>
-              <a:rPr lang="de-CH" sz="1400" i="1" dirty="0" err="1" smtClean="0"/>
-              <a:t>specific</a:t>
-            </a:r>
-            <a:r>
-              <a:rPr lang="de-CH" sz="1400" i="1" dirty="0" smtClean="0"/>
-              <a:t> </a:t>
-            </a:r>
-            <a:r>
-              <a:rPr lang="de-CH" sz="1400" i="1" dirty="0" err="1" smtClean="0"/>
-              <a:t>classes</a:t>
-            </a:r>
-            <a:r>
-              <a:rPr lang="de-CH" sz="1400" i="1" dirty="0" smtClean="0"/>
-              <a:t> in Eiffel Studio</a:t>
-            </a:r>
-            <a:endParaRPr lang="en-US" sz="1400" i="1" dirty="0"/>
-          </a:p>
-        </p:txBody>
-      </p:sp>
-      <p:sp>
-        <p:nvSpPr>
-          <p:cNvPr id="57" name="Ellipse 56"/>
-          <p:cNvSpPr/>
-          <p:nvPr/>
-        </p:nvSpPr>
-        <p:spPr>
-          <a:xfrm>
-            <a:off x="3357554" y="3857628"/>
-            <a:ext cx="1285884" cy="500066"/>
-          </a:xfrm>
-          <a:prstGeom prst="ellipse">
-            <a:avLst/>
-          </a:prstGeom>
-          <a:solidFill>
-            <a:schemeClr val="bg1">
-              <a:lumMod val="85000"/>
-            </a:schemeClr>
-          </a:solidFill>
-          <a:ln w="9525">
-            <a:solidFill>
-              <a:schemeClr val="tx1"/>
-            </a:solidFill>
-          </a:ln>
-        </p:spPr>
-        <p:style>
-          <a:lnRef idx="2">
-            <a:schemeClr val="accent1">
-              <a:shade val="50000"/>
-            </a:schemeClr>
-          </a:lnRef>
-          <a:fillRef idx="1">
-            <a:schemeClr val="accent1"/>
-          </a:fillRef>
-          <a:effectRef idx="0">
-            <a:schemeClr val="accent1"/>
-          </a:effectRef>
-          <a:fontRef idx="minor">
-            <a:schemeClr val="lt1"/>
-          </a:fontRef>
-        </p:style>
-        <p:txBody>
-          <a:bodyPr rtlCol="0" anchor="ctr"/>
-          <a:lstStyle/>
-          <a:p>
-            <a:pPr algn="ctr"/>
-            <a:r>
-              <a:rPr lang="de-CH" sz="1200" dirty="0" err="1" smtClean="0">
-                <a:solidFill>
-                  <a:schemeClr val="tx1"/>
-                </a:solidFill>
-              </a:rPr>
-              <a:t>hi_servlet.e</a:t>
-            </a:r>
-            <a:endParaRPr lang="en-US" dirty="0">
-              <a:solidFill>
-                <a:schemeClr val="tx1"/>
-              </a:solidFill>
-            </a:endParaRPr>
-          </a:p>
-        </p:txBody>
-      </p:sp>
-      <p:sp>
-        <p:nvSpPr>
-          <p:cNvPr id="59" name="Ellipse 58"/>
-          <p:cNvSpPr/>
-          <p:nvPr/>
-        </p:nvSpPr>
-        <p:spPr>
-          <a:xfrm>
-            <a:off x="7286644" y="2357430"/>
-            <a:ext cx="1571636" cy="714380"/>
-          </a:xfrm>
-          <a:prstGeom prst="ellipse">
-            <a:avLst/>
-          </a:prstGeom>
-          <a:solidFill>
-            <a:schemeClr val="bg1">
-              <a:lumMod val="85000"/>
-            </a:schemeClr>
-          </a:solidFill>
-          <a:ln w="9525">
-            <a:solidFill>
-              <a:schemeClr val="tx1"/>
-            </a:solidFill>
-          </a:ln>
-        </p:spPr>
-        <p:style>
-          <a:lnRef idx="2">
-            <a:schemeClr val="accent1">
-              <a:shade val="50000"/>
-            </a:schemeClr>
-          </a:lnRef>
-          <a:fillRef idx="1">
-            <a:schemeClr val="accent1"/>
-          </a:fillRef>
-          <a:effectRef idx="0">
-            <a:schemeClr val="accent1"/>
-          </a:effectRef>
-          <a:fontRef idx="minor">
-            <a:schemeClr val="lt1"/>
-          </a:fontRef>
-        </p:style>
-        <p:txBody>
-          <a:bodyPr rtlCol="0" anchor="ctr"/>
-          <a:lstStyle/>
-          <a:p>
-            <a:pPr algn="ctr"/>
-            <a:r>
-              <a:rPr lang="de-CH" sz="1200" dirty="0" err="1" smtClean="0">
-                <a:solidFill>
-                  <a:schemeClr val="tx1"/>
-                </a:solidFill>
-              </a:rPr>
-              <a:t>hi_controller.e</a:t>
-            </a:r>
-            <a:endParaRPr lang="en-US" dirty="0">
-              <a:solidFill>
-                <a:schemeClr val="tx1"/>
-              </a:solidFill>
-            </a:endParaRPr>
-          </a:p>
-        </p:txBody>
-      </p:sp>
-      <p:sp>
-        <p:nvSpPr>
-          <p:cNvPr id="60" name="Pfeil nach unten 59"/>
-          <p:cNvSpPr/>
-          <p:nvPr/>
-        </p:nvSpPr>
-        <p:spPr>
-          <a:xfrm rot="16200000">
-            <a:off x="5643570" y="2928934"/>
-            <a:ext cx="500066" cy="2357454"/>
-          </a:xfrm>
-          <a:prstGeom prst="downArrow">
-            <a:avLst/>
-          </a:prstGeom>
-        </p:spPr>
-        <p:style>
-          <a:lnRef idx="2">
-            <a:schemeClr val="accent5">
-              <a:shade val="50000"/>
-            </a:schemeClr>
-          </a:lnRef>
-          <a:fillRef idx="1">
-            <a:schemeClr val="accent5"/>
-          </a:fillRef>
-          <a:effectRef idx="0">
-            <a:schemeClr val="accent5"/>
-          </a:effectRef>
-          <a:fontRef idx="minor">
-            <a:schemeClr val="lt1"/>
-          </a:fontRef>
-        </p:style>
-        <p:txBody>
-          <a:bodyPr rtlCol="0" anchor="ctr"/>
-          <a:lstStyle/>
-          <a:p>
-            <a:pPr algn="ctr"/>
-            <a:endParaRPr lang="en-US" dirty="0"/>
-          </a:p>
-        </p:txBody>
-      </p:sp>
-      <p:sp>
-        <p:nvSpPr>
-          <p:cNvPr id="63" name="Pfeil nach unten 62"/>
-          <p:cNvSpPr/>
-          <p:nvPr/>
-        </p:nvSpPr>
-        <p:spPr>
-          <a:xfrm>
-            <a:off x="7786710" y="3143248"/>
-            <a:ext cx="500066" cy="500066"/>
-          </a:xfrm>
-          <a:prstGeom prst="downArrow">
-            <a:avLst/>
-          </a:prstGeom>
-        </p:spPr>
-        <p:style>
-          <a:lnRef idx="2">
-            <a:schemeClr val="accent5">
-              <a:shade val="50000"/>
-            </a:schemeClr>
-          </a:lnRef>
-          <a:fillRef idx="1">
-            <a:schemeClr val="accent5"/>
-          </a:fillRef>
-          <a:effectRef idx="0">
-            <a:schemeClr val="accent5"/>
-          </a:effectRef>
-          <a:fontRef idx="minor">
-            <a:schemeClr val="lt1"/>
-          </a:fontRef>
-        </p:style>
-        <p:txBody>
-          <a:bodyPr rtlCol="0" anchor="ctr"/>
-          <a:lstStyle/>
-          <a:p>
-            <a:pPr algn="ctr"/>
-            <a:endParaRPr lang="en-US" dirty="0"/>
-          </a:p>
-        </p:txBody>
-      </p:sp>
-      <p:sp>
-        <p:nvSpPr>
-          <p:cNvPr id="66" name="Pfeil nach unten 65"/>
-          <p:cNvSpPr/>
-          <p:nvPr/>
-        </p:nvSpPr>
-        <p:spPr>
-          <a:xfrm>
-            <a:off x="7786710" y="4714884"/>
-            <a:ext cx="500066" cy="500066"/>
-          </a:xfrm>
-          <a:prstGeom prst="downArrow">
-            <a:avLst/>
-          </a:prstGeom>
-        </p:spPr>
-        <p:style>
-          <a:lnRef idx="2">
-            <a:schemeClr val="accent5">
-              <a:shade val="50000"/>
-            </a:schemeClr>
-          </a:lnRef>
-          <a:fillRef idx="1">
-            <a:schemeClr val="accent5"/>
-          </a:fillRef>
-          <a:effectRef idx="0">
-            <a:schemeClr val="accent5"/>
-          </a:effectRef>
-          <a:fontRef idx="minor">
-            <a:schemeClr val="lt1"/>
-          </a:fontRef>
-        </p:style>
-        <p:txBody>
-          <a:bodyPr rtlCol="0" anchor="ctr"/>
-          <a:lstStyle/>
-          <a:p>
-            <a:pPr algn="ctr"/>
-            <a:endParaRPr lang="en-US" dirty="0"/>
-          </a:p>
-        </p:txBody>
-      </p:sp>
-      <p:sp>
-        <p:nvSpPr>
-          <p:cNvPr id="67" name="Ellipse 66"/>
-          <p:cNvSpPr/>
-          <p:nvPr/>
-        </p:nvSpPr>
-        <p:spPr>
-          <a:xfrm>
-            <a:off x="7429520" y="5286388"/>
-            <a:ext cx="1143008" cy="571504"/>
-          </a:xfrm>
-          <a:prstGeom prst="ellipse">
-            <a:avLst/>
-          </a:prstGeom>
-          <a:solidFill>
-            <a:schemeClr val="bg1">
-              <a:lumMod val="85000"/>
-            </a:schemeClr>
-          </a:solidFill>
-          <a:ln w="9525">
-            <a:solidFill>
-              <a:schemeClr val="tx1"/>
-            </a:solidFill>
-          </a:ln>
-        </p:spPr>
-        <p:style>
-          <a:lnRef idx="2">
-            <a:schemeClr val="accent1">
-              <a:shade val="50000"/>
-            </a:schemeClr>
-          </a:lnRef>
-          <a:fillRef idx="1">
-            <a:schemeClr val="accent1"/>
-          </a:fillRef>
-          <a:effectRef idx="0">
-            <a:schemeClr val="accent1"/>
-          </a:effectRef>
-          <a:fontRef idx="minor">
-            <a:schemeClr val="lt1"/>
-          </a:fontRef>
-        </p:style>
-        <p:txBody>
-          <a:bodyPr rtlCol="0" anchor="ctr"/>
-          <a:lstStyle/>
-          <a:p>
-            <a:pPr algn="ctr"/>
-            <a:r>
-              <a:rPr lang="de-CH" sz="1100" dirty="0" smtClean="0">
-                <a:solidFill>
-                  <a:schemeClr val="tx2">
-                    <a:lumMod val="60000"/>
-                    <a:lumOff val="40000"/>
-                  </a:schemeClr>
-                </a:solidFill>
-              </a:rPr>
-              <a:t>hi_app.exe</a:t>
-            </a:r>
-            <a:endParaRPr lang="en-US" sz="1600" dirty="0">
-              <a:solidFill>
-                <a:schemeClr val="tx2">
-                  <a:lumMod val="60000"/>
-                  <a:lumOff val="40000"/>
-                </a:schemeClr>
-              </a:solidFill>
-            </a:endParaRPr>
-          </a:p>
-        </p:txBody>
-      </p:sp>
-      <p:sp>
-        <p:nvSpPr>
-          <p:cNvPr id="68" name="Textfeld 67"/>
-          <p:cNvSpPr txBox="1"/>
-          <p:nvPr/>
-        </p:nvSpPr>
-        <p:spPr>
-          <a:xfrm>
-            <a:off x="4286248" y="5429264"/>
-            <a:ext cx="3286148" cy="523220"/>
-          </a:xfrm>
-          <a:prstGeom prst="rect">
-            <a:avLst/>
-          </a:prstGeom>
-          <a:noFill/>
-        </p:spPr>
-        <p:txBody>
-          <a:bodyPr wrap="square" rtlCol="0">
-            <a:spAutoFit/>
-          </a:bodyPr>
-          <a:lstStyle/>
-          <a:p>
-            <a:r>
-              <a:rPr lang="de-CH" sz="1400" i="1" dirty="0" err="1" smtClean="0"/>
-              <a:t>Compile</a:t>
-            </a:r>
-            <a:r>
-              <a:rPr lang="de-CH" sz="1400" i="1" dirty="0" smtClean="0"/>
-              <a:t> </a:t>
-            </a:r>
-            <a:r>
-              <a:rPr lang="de-CH" sz="1400" i="1" dirty="0" err="1" smtClean="0"/>
-              <a:t>application</a:t>
-            </a:r>
-            <a:r>
-              <a:rPr lang="de-CH" sz="1400" i="1" dirty="0" smtClean="0"/>
-              <a:t> in Eiffel Studio </a:t>
-            </a:r>
-            <a:r>
-              <a:rPr lang="de-CH" sz="1400" i="1" dirty="0" err="1" smtClean="0"/>
-              <a:t>and</a:t>
-            </a:r>
-            <a:r>
-              <a:rPr lang="de-CH" sz="1400" i="1" dirty="0" smtClean="0"/>
-              <a:t> </a:t>
-            </a:r>
-            <a:r>
-              <a:rPr lang="de-CH" sz="1400" i="1" dirty="0" err="1" smtClean="0"/>
-              <a:t>load</a:t>
-            </a:r>
-            <a:r>
-              <a:rPr lang="de-CH" sz="1400" i="1" dirty="0" smtClean="0"/>
-              <a:t> </a:t>
-            </a:r>
-            <a:r>
-              <a:rPr lang="de-CH" sz="1400" i="1" dirty="0" err="1" smtClean="0"/>
-              <a:t>it</a:t>
-            </a:r>
-            <a:r>
-              <a:rPr lang="de-CH" sz="1400" i="1" dirty="0" smtClean="0"/>
-              <a:t> </a:t>
-            </a:r>
-            <a:r>
-              <a:rPr lang="de-CH" sz="1400" i="1" dirty="0" err="1" smtClean="0"/>
-              <a:t>into</a:t>
-            </a:r>
-            <a:r>
-              <a:rPr lang="de-CH" sz="1400" i="1" dirty="0" smtClean="0"/>
-              <a:t> </a:t>
-            </a:r>
-            <a:r>
-              <a:rPr lang="de-CH" sz="1400" i="1" dirty="0" err="1" smtClean="0"/>
-              <a:t>XEbraServer</a:t>
-            </a:r>
-            <a:endParaRPr lang="en-US" sz="1400" i="1" dirty="0"/>
+              <a:rPr lang="de-CH" sz="1000" dirty="0" err="1" smtClean="0"/>
+              <a:t>Translator</a:t>
+            </a:r>
+            <a:endParaRPr lang="de-CH" sz="1000" dirty="0" smtClean="0"/>
           </a:p>
         </p:txBody>
       </p:sp>

</xml_diff>